<commit_message>
Added purple stickman pictures
</commit_message>
<xml_diff>
--- a/graphics.pptx
+++ b/graphics.pptx
@@ -104,6 +104,11 @@
       </a:defRPr>
     </a:lvl9pPr>
   </p:defaultTextStyle>
+  <p:extLst>
+    <p:ext uri="{EFAFB233-063F-42B5-8137-9DF3F51BA10A}">
+      <p15:sldGuideLst xmlns:p15="http://schemas.microsoft.com/office/powerpoint/2012/main"/>
+    </p:ext>
+  </p:extLst>
 </p:presentation>
 </file>
 
@@ -256,7 +261,7 @@
           <a:p>
             <a:fld id="{674ECA42-3D52-46E6-AF3F-D41E75B808C7}" type="datetimeFigureOut">
               <a:rPr lang="en-CA" smtClean="0"/>
-              <a:t>2019-04-15</a:t>
+              <a:t>2019-04-16</a:t>
             </a:fld>
             <a:endParaRPr lang="en-CA"/>
           </a:p>
@@ -456,7 +461,7 @@
           <a:p>
             <a:fld id="{674ECA42-3D52-46E6-AF3F-D41E75B808C7}" type="datetimeFigureOut">
               <a:rPr lang="en-CA" smtClean="0"/>
-              <a:t>2019-04-15</a:t>
+              <a:t>2019-04-16</a:t>
             </a:fld>
             <a:endParaRPr lang="en-CA"/>
           </a:p>
@@ -666,7 +671,7 @@
           <a:p>
             <a:fld id="{674ECA42-3D52-46E6-AF3F-D41E75B808C7}" type="datetimeFigureOut">
               <a:rPr lang="en-CA" smtClean="0"/>
-              <a:t>2019-04-15</a:t>
+              <a:t>2019-04-16</a:t>
             </a:fld>
             <a:endParaRPr lang="en-CA"/>
           </a:p>
@@ -866,7 +871,7 @@
           <a:p>
             <a:fld id="{674ECA42-3D52-46E6-AF3F-D41E75B808C7}" type="datetimeFigureOut">
               <a:rPr lang="en-CA" smtClean="0"/>
-              <a:t>2019-04-15</a:t>
+              <a:t>2019-04-16</a:t>
             </a:fld>
             <a:endParaRPr lang="en-CA"/>
           </a:p>
@@ -1142,7 +1147,7 @@
           <a:p>
             <a:fld id="{674ECA42-3D52-46E6-AF3F-D41E75B808C7}" type="datetimeFigureOut">
               <a:rPr lang="en-CA" smtClean="0"/>
-              <a:t>2019-04-15</a:t>
+              <a:t>2019-04-16</a:t>
             </a:fld>
             <a:endParaRPr lang="en-CA"/>
           </a:p>
@@ -1410,7 +1415,7 @@
           <a:p>
             <a:fld id="{674ECA42-3D52-46E6-AF3F-D41E75B808C7}" type="datetimeFigureOut">
               <a:rPr lang="en-CA" smtClean="0"/>
-              <a:t>2019-04-15</a:t>
+              <a:t>2019-04-16</a:t>
             </a:fld>
             <a:endParaRPr lang="en-CA"/>
           </a:p>
@@ -1825,7 +1830,7 @@
           <a:p>
             <a:fld id="{674ECA42-3D52-46E6-AF3F-D41E75B808C7}" type="datetimeFigureOut">
               <a:rPr lang="en-CA" smtClean="0"/>
-              <a:t>2019-04-15</a:t>
+              <a:t>2019-04-16</a:t>
             </a:fld>
             <a:endParaRPr lang="en-CA"/>
           </a:p>
@@ -1967,7 +1972,7 @@
           <a:p>
             <a:fld id="{674ECA42-3D52-46E6-AF3F-D41E75B808C7}" type="datetimeFigureOut">
               <a:rPr lang="en-CA" smtClean="0"/>
-              <a:t>2019-04-15</a:t>
+              <a:t>2019-04-16</a:t>
             </a:fld>
             <a:endParaRPr lang="en-CA"/>
           </a:p>
@@ -2080,7 +2085,7 @@
           <a:p>
             <a:fld id="{674ECA42-3D52-46E6-AF3F-D41E75B808C7}" type="datetimeFigureOut">
               <a:rPr lang="en-CA" smtClean="0"/>
-              <a:t>2019-04-15</a:t>
+              <a:t>2019-04-16</a:t>
             </a:fld>
             <a:endParaRPr lang="en-CA"/>
           </a:p>
@@ -2393,7 +2398,7 @@
           <a:p>
             <a:fld id="{674ECA42-3D52-46E6-AF3F-D41E75B808C7}" type="datetimeFigureOut">
               <a:rPr lang="en-CA" smtClean="0"/>
-              <a:t>2019-04-15</a:t>
+              <a:t>2019-04-16</a:t>
             </a:fld>
             <a:endParaRPr lang="en-CA"/>
           </a:p>
@@ -2682,7 +2687,7 @@
           <a:p>
             <a:fld id="{674ECA42-3D52-46E6-AF3F-D41E75B808C7}" type="datetimeFigureOut">
               <a:rPr lang="en-CA" smtClean="0"/>
-              <a:t>2019-04-15</a:t>
+              <a:t>2019-04-16</a:t>
             </a:fld>
             <a:endParaRPr lang="en-CA"/>
           </a:p>
@@ -2925,7 +2930,7 @@
           <a:p>
             <a:fld id="{674ECA42-3D52-46E6-AF3F-D41E75B808C7}" type="datetimeFigureOut">
               <a:rPr lang="en-CA" smtClean="0"/>
-              <a:t>2019-04-15</a:t>
+              <a:t>2019-04-16</a:t>
             </a:fld>
             <a:endParaRPr lang="en-CA"/>
           </a:p>
@@ -3932,6 +3937,591 @@
           </p:cxnSp>
         </p:grpSp>
       </p:grpSp>
+      <p:grpSp>
+        <p:nvGrpSpPr>
+          <p:cNvPr id="15" name="Group 14">
+            <a:extLst>
+              <a:ext uri="{FF2B5EF4-FFF2-40B4-BE49-F238E27FC236}">
+                <a16:creationId xmlns:a16="http://schemas.microsoft.com/office/drawing/2014/main" id="{0CAC238E-E1A2-41CC-98A5-40329A833ECA}"/>
+              </a:ext>
+            </a:extLst>
+          </p:cNvPr>
+          <p:cNvGrpSpPr/>
+          <p:nvPr/>
+        </p:nvGrpSpPr>
+        <p:grpSpPr>
+          <a:xfrm>
+            <a:off x="2325150" y="3951215"/>
+            <a:ext cx="436225" cy="933973"/>
+            <a:chOff x="2325150" y="3951215"/>
+            <a:chExt cx="436225" cy="933973"/>
+          </a:xfrm>
+        </p:grpSpPr>
+        <p:grpSp>
+          <p:nvGrpSpPr>
+            <p:cNvPr id="17" name="Group 16">
+              <a:extLst>
+                <a:ext uri="{FF2B5EF4-FFF2-40B4-BE49-F238E27FC236}">
+                  <a16:creationId xmlns:a16="http://schemas.microsoft.com/office/drawing/2014/main" id="{DD54304D-3B9D-4B13-8C3A-4808CACC17F5}"/>
+                </a:ext>
+              </a:extLst>
+            </p:cNvPr>
+            <p:cNvGrpSpPr/>
+            <p:nvPr/>
+          </p:nvGrpSpPr>
+          <p:grpSpPr>
+            <a:xfrm>
+              <a:off x="2325150" y="3960305"/>
+              <a:ext cx="436225" cy="924883"/>
+              <a:chOff x="6853807" y="1609989"/>
+              <a:chExt cx="436225" cy="924883"/>
+            </a:xfrm>
+          </p:grpSpPr>
+          <p:sp>
+            <p:nvSpPr>
+              <p:cNvPr id="18" name="Oval 17">
+                <a:extLst>
+                  <a:ext uri="{FF2B5EF4-FFF2-40B4-BE49-F238E27FC236}">
+                    <a16:creationId xmlns:a16="http://schemas.microsoft.com/office/drawing/2014/main" id="{37DC1780-92AE-430F-BA9A-0F99F57BE4ED}"/>
+                  </a:ext>
+                </a:extLst>
+              </p:cNvPr>
+              <p:cNvSpPr/>
+              <p:nvPr/>
+            </p:nvSpPr>
+            <p:spPr>
+              <a:xfrm>
+                <a:off x="6904139" y="1609989"/>
+                <a:ext cx="343949" cy="343949"/>
+              </a:xfrm>
+              <a:prstGeom prst="ellipse">
+                <a:avLst/>
+              </a:prstGeom>
+              <a:solidFill>
+                <a:schemeClr val="tx1"/>
+              </a:solidFill>
+              <a:ln>
+                <a:solidFill>
+                  <a:schemeClr val="tx1"/>
+                </a:solidFill>
+              </a:ln>
+            </p:spPr>
+            <p:style>
+              <a:lnRef idx="2">
+                <a:schemeClr val="accent1">
+                  <a:shade val="50000"/>
+                </a:schemeClr>
+              </a:lnRef>
+              <a:fillRef idx="1">
+                <a:schemeClr val="accent1"/>
+              </a:fillRef>
+              <a:effectRef idx="0">
+                <a:schemeClr val="accent1"/>
+              </a:effectRef>
+              <a:fontRef idx="minor">
+                <a:schemeClr val="lt1"/>
+              </a:fontRef>
+            </p:style>
+            <p:txBody>
+              <a:bodyPr rtlCol="0" anchor="ctr"/>
+              <a:lstStyle/>
+              <a:p>
+                <a:pPr algn="ctr"/>
+                <a:endParaRPr lang="en-CA"/>
+              </a:p>
+            </p:txBody>
+          </p:sp>
+          <p:cxnSp>
+            <p:nvCxnSpPr>
+              <p:cNvPr id="20" name="Straight Connector 19">
+                <a:extLst>
+                  <a:ext uri="{FF2B5EF4-FFF2-40B4-BE49-F238E27FC236}">
+                    <a16:creationId xmlns:a16="http://schemas.microsoft.com/office/drawing/2014/main" id="{B6D51A8F-17DA-4927-A1E7-A70D5D109627}"/>
+                  </a:ext>
+                </a:extLst>
+              </p:cNvPr>
+              <p:cNvCxnSpPr>
+                <a:stCxn id="18" idx="4"/>
+              </p:cNvCxnSpPr>
+              <p:nvPr/>
+            </p:nvCxnSpPr>
+            <p:spPr>
+              <a:xfrm flipH="1">
+                <a:off x="7071919" y="1953938"/>
+                <a:ext cx="4195" cy="361423"/>
+              </a:xfrm>
+              <a:prstGeom prst="line">
+                <a:avLst/>
+              </a:prstGeom>
+              <a:ln w="38100">
+                <a:solidFill>
+                  <a:schemeClr val="tx1"/>
+                </a:solidFill>
+              </a:ln>
+            </p:spPr>
+            <p:style>
+              <a:lnRef idx="1">
+                <a:schemeClr val="accent1"/>
+              </a:lnRef>
+              <a:fillRef idx="0">
+                <a:schemeClr val="accent1"/>
+              </a:fillRef>
+              <a:effectRef idx="0">
+                <a:schemeClr val="accent1"/>
+              </a:effectRef>
+              <a:fontRef idx="minor">
+                <a:schemeClr val="tx1"/>
+              </a:fontRef>
+            </p:style>
+          </p:cxnSp>
+          <p:cxnSp>
+            <p:nvCxnSpPr>
+              <p:cNvPr id="22" name="Straight Connector 21">
+                <a:extLst>
+                  <a:ext uri="{FF2B5EF4-FFF2-40B4-BE49-F238E27FC236}">
+                    <a16:creationId xmlns:a16="http://schemas.microsoft.com/office/drawing/2014/main" id="{BE970E9A-3F30-4BE2-9D00-4FDC8FA17A98}"/>
+                  </a:ext>
+                </a:extLst>
+              </p:cNvPr>
+              <p:cNvCxnSpPr/>
+              <p:nvPr/>
+            </p:nvCxnSpPr>
+            <p:spPr>
+              <a:xfrm flipV="1">
+                <a:off x="7071919" y="1996580"/>
+                <a:ext cx="218113" cy="218113"/>
+              </a:xfrm>
+              <a:prstGeom prst="line">
+                <a:avLst/>
+              </a:prstGeom>
+              <a:ln w="38100">
+                <a:solidFill>
+                  <a:schemeClr val="tx1"/>
+                </a:solidFill>
+              </a:ln>
+            </p:spPr>
+            <p:style>
+              <a:lnRef idx="1">
+                <a:schemeClr val="accent1"/>
+              </a:lnRef>
+              <a:fillRef idx="0">
+                <a:schemeClr val="accent1"/>
+              </a:fillRef>
+              <a:effectRef idx="0">
+                <a:schemeClr val="accent1"/>
+              </a:effectRef>
+              <a:fontRef idx="minor">
+                <a:schemeClr val="tx1"/>
+              </a:fontRef>
+            </p:style>
+          </p:cxnSp>
+          <p:cxnSp>
+            <p:nvCxnSpPr>
+              <p:cNvPr id="25" name="Straight Connector 24">
+                <a:extLst>
+                  <a:ext uri="{FF2B5EF4-FFF2-40B4-BE49-F238E27FC236}">
+                    <a16:creationId xmlns:a16="http://schemas.microsoft.com/office/drawing/2014/main" id="{EB81968C-8A4D-4FD6-BC74-6EE56C7CF665}"/>
+                  </a:ext>
+                </a:extLst>
+              </p:cNvPr>
+              <p:cNvCxnSpPr>
+                <a:cxnSpLocks/>
+              </p:cNvCxnSpPr>
+              <p:nvPr/>
+            </p:nvCxnSpPr>
+            <p:spPr>
+              <a:xfrm flipH="1" flipV="1">
+                <a:off x="6853807" y="2005670"/>
+                <a:ext cx="218112" cy="209023"/>
+              </a:xfrm>
+              <a:prstGeom prst="line">
+                <a:avLst/>
+              </a:prstGeom>
+              <a:ln w="38100">
+                <a:solidFill>
+                  <a:schemeClr val="tx1"/>
+                </a:solidFill>
+              </a:ln>
+            </p:spPr>
+            <p:style>
+              <a:lnRef idx="1">
+                <a:schemeClr val="accent1"/>
+              </a:lnRef>
+              <a:fillRef idx="0">
+                <a:schemeClr val="accent1"/>
+              </a:fillRef>
+              <a:effectRef idx="0">
+                <a:schemeClr val="accent1"/>
+              </a:effectRef>
+              <a:fontRef idx="minor">
+                <a:schemeClr val="tx1"/>
+              </a:fontRef>
+            </p:style>
+          </p:cxnSp>
+          <p:grpSp>
+            <p:nvGrpSpPr>
+              <p:cNvPr id="26" name="Group 25">
+                <a:extLst>
+                  <a:ext uri="{FF2B5EF4-FFF2-40B4-BE49-F238E27FC236}">
+                    <a16:creationId xmlns:a16="http://schemas.microsoft.com/office/drawing/2014/main" id="{A7AD13AC-F7C2-43FD-B623-E975F4E65C03}"/>
+                  </a:ext>
+                </a:extLst>
+              </p:cNvPr>
+              <p:cNvGrpSpPr/>
+              <p:nvPr/>
+            </p:nvGrpSpPr>
+            <p:grpSpPr>
+              <a:xfrm rot="10800000">
+                <a:off x="6853807" y="2316759"/>
+                <a:ext cx="436225" cy="218113"/>
+                <a:chOff x="6962863" y="2659310"/>
+                <a:chExt cx="436225" cy="218113"/>
+              </a:xfrm>
+            </p:grpSpPr>
+            <p:cxnSp>
+              <p:nvCxnSpPr>
+                <p:cNvPr id="31" name="Straight Connector 30">
+                  <a:extLst>
+                    <a:ext uri="{FF2B5EF4-FFF2-40B4-BE49-F238E27FC236}">
+                      <a16:creationId xmlns:a16="http://schemas.microsoft.com/office/drawing/2014/main" id="{6D5A619D-1370-4823-8A1A-82CA215352EC}"/>
+                    </a:ext>
+                  </a:extLst>
+                </p:cNvPr>
+                <p:cNvCxnSpPr/>
+                <p:nvPr/>
+              </p:nvCxnSpPr>
+              <p:spPr>
+                <a:xfrm flipV="1">
+                  <a:off x="7180975" y="2659310"/>
+                  <a:ext cx="218113" cy="218113"/>
+                </a:xfrm>
+                <a:prstGeom prst="line">
+                  <a:avLst/>
+                </a:prstGeom>
+                <a:ln w="38100">
+                  <a:solidFill>
+                    <a:schemeClr val="tx1"/>
+                  </a:solidFill>
+                </a:ln>
+              </p:spPr>
+              <p:style>
+                <a:lnRef idx="1">
+                  <a:schemeClr val="accent1"/>
+                </a:lnRef>
+                <a:fillRef idx="0">
+                  <a:schemeClr val="accent1"/>
+                </a:fillRef>
+                <a:effectRef idx="0">
+                  <a:schemeClr val="accent1"/>
+                </a:effectRef>
+                <a:fontRef idx="minor">
+                  <a:schemeClr val="tx1"/>
+                </a:fontRef>
+              </p:style>
+            </p:cxnSp>
+            <p:cxnSp>
+              <p:nvCxnSpPr>
+                <p:cNvPr id="32" name="Straight Connector 31">
+                  <a:extLst>
+                    <a:ext uri="{FF2B5EF4-FFF2-40B4-BE49-F238E27FC236}">
+                      <a16:creationId xmlns:a16="http://schemas.microsoft.com/office/drawing/2014/main" id="{46064F73-33A1-4306-A9B1-4395DA81B857}"/>
+                    </a:ext>
+                  </a:extLst>
+                </p:cNvPr>
+                <p:cNvCxnSpPr>
+                  <a:cxnSpLocks/>
+                </p:cNvCxnSpPr>
+                <p:nvPr/>
+              </p:nvCxnSpPr>
+              <p:spPr>
+                <a:xfrm flipH="1" flipV="1">
+                  <a:off x="6962863" y="2668400"/>
+                  <a:ext cx="218112" cy="209023"/>
+                </a:xfrm>
+                <a:prstGeom prst="line">
+                  <a:avLst/>
+                </a:prstGeom>
+                <a:ln w="38100">
+                  <a:solidFill>
+                    <a:schemeClr val="tx1"/>
+                  </a:solidFill>
+                </a:ln>
+              </p:spPr>
+              <p:style>
+                <a:lnRef idx="1">
+                  <a:schemeClr val="accent1"/>
+                </a:lnRef>
+                <a:fillRef idx="0">
+                  <a:schemeClr val="accent1"/>
+                </a:fillRef>
+                <a:effectRef idx="0">
+                  <a:schemeClr val="accent1"/>
+                </a:effectRef>
+                <a:fontRef idx="minor">
+                  <a:schemeClr val="tx1"/>
+                </a:fontRef>
+              </p:style>
+            </p:cxnSp>
+          </p:grpSp>
+        </p:grpSp>
+        <p:sp>
+          <p:nvSpPr>
+            <p:cNvPr id="3" name="Arc 2">
+              <a:extLst>
+                <a:ext uri="{FF2B5EF4-FFF2-40B4-BE49-F238E27FC236}">
+                  <a16:creationId xmlns:a16="http://schemas.microsoft.com/office/drawing/2014/main" id="{1E2A686E-0B88-4AD4-8F82-CDA60189FE8A}"/>
+                </a:ext>
+              </a:extLst>
+            </p:cNvPr>
+            <p:cNvSpPr/>
+            <p:nvPr/>
+          </p:nvSpPr>
+          <p:spPr>
+            <a:xfrm flipV="1">
+              <a:off x="2375482" y="3951215"/>
+              <a:ext cx="343949" cy="156159"/>
+            </a:xfrm>
+            <a:prstGeom prst="arc">
+              <a:avLst>
+                <a:gd name="adj1" fmla="val 11243172"/>
+                <a:gd name="adj2" fmla="val 21239460"/>
+              </a:avLst>
+            </a:prstGeom>
+            <a:noFill/>
+            <a:ln w="38100">
+              <a:solidFill>
+                <a:srgbClr val="7030A0"/>
+              </a:solidFill>
+            </a:ln>
+          </p:spPr>
+          <p:style>
+            <a:lnRef idx="1">
+              <a:schemeClr val="accent1"/>
+            </a:lnRef>
+            <a:fillRef idx="0">
+              <a:schemeClr val="accent1"/>
+            </a:fillRef>
+            <a:effectRef idx="0">
+              <a:schemeClr val="accent1"/>
+            </a:effectRef>
+            <a:fontRef idx="minor">
+              <a:schemeClr val="tx1"/>
+            </a:fontRef>
+          </p:style>
+          <p:txBody>
+            <a:bodyPr rtlCol="0" anchor="ctr"/>
+            <a:lstStyle/>
+            <a:p>
+              <a:pPr algn="ctr"/>
+              <a:endParaRPr lang="en-CA"/>
+            </a:p>
+          </p:txBody>
+        </p:sp>
+        <p:sp>
+          <p:nvSpPr>
+            <p:cNvPr id="4" name="Rectangle 3">
+              <a:extLst>
+                <a:ext uri="{FF2B5EF4-FFF2-40B4-BE49-F238E27FC236}">
+                  <a16:creationId xmlns:a16="http://schemas.microsoft.com/office/drawing/2014/main" id="{3E49B977-9545-42C7-A35B-34D0840344F8}"/>
+                </a:ext>
+              </a:extLst>
+            </p:cNvPr>
+            <p:cNvSpPr/>
+            <p:nvPr/>
+          </p:nvSpPr>
+          <p:spPr>
+            <a:xfrm>
+              <a:off x="2434206" y="4406320"/>
+              <a:ext cx="218112" cy="383862"/>
+            </a:xfrm>
+            <a:prstGeom prst="rect">
+              <a:avLst/>
+            </a:prstGeom>
+            <a:solidFill>
+              <a:srgbClr val="7030A0"/>
+            </a:solidFill>
+            <a:ln>
+              <a:noFill/>
+            </a:ln>
+          </p:spPr>
+          <p:style>
+            <a:lnRef idx="2">
+              <a:schemeClr val="accent1">
+                <a:shade val="50000"/>
+              </a:schemeClr>
+            </a:lnRef>
+            <a:fillRef idx="1">
+              <a:schemeClr val="accent1"/>
+            </a:fillRef>
+            <a:effectRef idx="0">
+              <a:schemeClr val="accent1"/>
+            </a:effectRef>
+            <a:fontRef idx="minor">
+              <a:schemeClr val="lt1"/>
+            </a:fontRef>
+          </p:style>
+          <p:txBody>
+            <a:bodyPr rtlCol="0" anchor="ctr"/>
+            <a:lstStyle/>
+            <a:p>
+              <a:pPr algn="ctr"/>
+              <a:endParaRPr lang="en-CA"/>
+            </a:p>
+          </p:txBody>
+        </p:sp>
+        <p:sp>
+          <p:nvSpPr>
+            <p:cNvPr id="5" name="Rectangle 4">
+              <a:extLst>
+                <a:ext uri="{FF2B5EF4-FFF2-40B4-BE49-F238E27FC236}">
+                  <a16:creationId xmlns:a16="http://schemas.microsoft.com/office/drawing/2014/main" id="{57EC2A86-A616-4582-A752-D7B5C66F3F15}"/>
+                </a:ext>
+              </a:extLst>
+            </p:cNvPr>
+            <p:cNvSpPr/>
+            <p:nvPr/>
+          </p:nvSpPr>
+          <p:spPr>
+            <a:xfrm>
+              <a:off x="2651168" y="4387903"/>
+              <a:ext cx="55679" cy="88847"/>
+            </a:xfrm>
+            <a:prstGeom prst="rect">
+              <a:avLst/>
+            </a:prstGeom>
+            <a:solidFill>
+              <a:srgbClr val="7030A0"/>
+            </a:solidFill>
+            <a:ln>
+              <a:solidFill>
+                <a:srgbClr val="7030A0"/>
+              </a:solidFill>
+            </a:ln>
+          </p:spPr>
+          <p:style>
+            <a:lnRef idx="2">
+              <a:schemeClr val="accent1">
+                <a:shade val="50000"/>
+              </a:schemeClr>
+            </a:lnRef>
+            <a:fillRef idx="1">
+              <a:schemeClr val="accent1"/>
+            </a:fillRef>
+            <a:effectRef idx="0">
+              <a:schemeClr val="accent1"/>
+            </a:effectRef>
+            <a:fontRef idx="minor">
+              <a:schemeClr val="lt1"/>
+            </a:fontRef>
+          </p:style>
+          <p:txBody>
+            <a:bodyPr rtlCol="0" anchor="ctr"/>
+            <a:lstStyle/>
+            <a:p>
+              <a:pPr algn="ctr"/>
+              <a:endParaRPr lang="en-CA"/>
+            </a:p>
+          </p:txBody>
+        </p:sp>
+        <p:sp>
+          <p:nvSpPr>
+            <p:cNvPr id="33" name="Rectangle 32">
+              <a:extLst>
+                <a:ext uri="{FF2B5EF4-FFF2-40B4-BE49-F238E27FC236}">
+                  <a16:creationId xmlns:a16="http://schemas.microsoft.com/office/drawing/2014/main" id="{F421FF23-6A76-4474-8B30-B75B1BF4BFCA}"/>
+                </a:ext>
+              </a:extLst>
+            </p:cNvPr>
+            <p:cNvSpPr/>
+            <p:nvPr/>
+          </p:nvSpPr>
+          <p:spPr>
+            <a:xfrm>
+              <a:off x="2379677" y="4387903"/>
+              <a:ext cx="55679" cy="88847"/>
+            </a:xfrm>
+            <a:prstGeom prst="rect">
+              <a:avLst/>
+            </a:prstGeom>
+            <a:solidFill>
+              <a:srgbClr val="7030A0"/>
+            </a:solidFill>
+            <a:ln>
+              <a:solidFill>
+                <a:srgbClr val="7030A0"/>
+              </a:solidFill>
+            </a:ln>
+          </p:spPr>
+          <p:style>
+            <a:lnRef idx="2">
+              <a:schemeClr val="accent1">
+                <a:shade val="50000"/>
+              </a:schemeClr>
+            </a:lnRef>
+            <a:fillRef idx="1">
+              <a:schemeClr val="accent1"/>
+            </a:fillRef>
+            <a:effectRef idx="0">
+              <a:schemeClr val="accent1"/>
+            </a:effectRef>
+            <a:fontRef idx="minor">
+              <a:schemeClr val="lt1"/>
+            </a:fontRef>
+          </p:style>
+          <p:txBody>
+            <a:bodyPr rtlCol="0" anchor="ctr"/>
+            <a:lstStyle/>
+            <a:p>
+              <a:pPr algn="ctr"/>
+              <a:endParaRPr lang="en-CA"/>
+            </a:p>
+          </p:txBody>
+        </p:sp>
+        <p:cxnSp>
+          <p:nvCxnSpPr>
+            <p:cNvPr id="14" name="Straight Connector 13">
+              <a:extLst>
+                <a:ext uri="{FF2B5EF4-FFF2-40B4-BE49-F238E27FC236}">
+                  <a16:creationId xmlns:a16="http://schemas.microsoft.com/office/drawing/2014/main" id="{A9675250-59B0-46F1-918C-1F99CA46BA9B}"/>
+                </a:ext>
+              </a:extLst>
+            </p:cNvPr>
+            <p:cNvCxnSpPr>
+              <a:stCxn id="4" idx="1"/>
+              <a:endCxn id="4" idx="3"/>
+            </p:cNvCxnSpPr>
+            <p:nvPr/>
+          </p:nvCxnSpPr>
+          <p:spPr>
+            <a:xfrm>
+              <a:off x="2434206" y="4598251"/>
+              <a:ext cx="218112" cy="0"/>
+            </a:xfrm>
+            <a:prstGeom prst="line">
+              <a:avLst/>
+            </a:prstGeom>
+            <a:ln w="19050">
+              <a:solidFill>
+                <a:schemeClr val="tx1"/>
+              </a:solidFill>
+            </a:ln>
+          </p:spPr>
+          <p:style>
+            <a:lnRef idx="1">
+              <a:schemeClr val="accent1"/>
+            </a:lnRef>
+            <a:fillRef idx="0">
+              <a:schemeClr val="accent1"/>
+            </a:fillRef>
+            <a:effectRef idx="0">
+              <a:schemeClr val="accent1"/>
+            </a:effectRef>
+            <a:fontRef idx="minor">
+              <a:schemeClr val="tx1"/>
+            </a:fontRef>
+          </p:style>
+        </p:cxnSp>
+      </p:grpSp>
     </p:spTree>
     <p:extLst>
       <p:ext uri="{BB962C8B-B14F-4D97-AF65-F5344CB8AC3E}">

</xml_diff>

<commit_message>
Created icon for google play store
</commit_message>
<xml_diff>
--- a/graphics.pptx
+++ b/graphics.pptx
@@ -6,6 +6,7 @@
   </p:sldMasterIdLst>
   <p:sldIdLst>
     <p:sldId id="256" r:id="rId2"/>
+    <p:sldId id="257" r:id="rId3"/>
   </p:sldIdLst>
   <p:sldSz cx="12192000" cy="6858000"/>
   <p:notesSz cx="6858000" cy="9144000"/>
@@ -13,8 +14,8 @@
     <a:defPPr>
       <a:defRPr lang="en-US"/>
     </a:defPPr>
-    <a:lvl1pPr marL="0" algn="l" defTabSz="914400" rtl="0" eaLnBrk="1" latinLnBrk="0" hangingPunct="1">
-      <a:defRPr sz="1800" kern="1200">
+    <a:lvl1pPr marL="0" algn="l" defTabSz="914399" rtl="0" eaLnBrk="1" latinLnBrk="0" hangingPunct="1">
+      <a:defRPr sz="1799" kern="1200">
         <a:solidFill>
           <a:schemeClr val="tx1"/>
         </a:solidFill>
@@ -23,8 +24,8 @@
         <a:cs typeface="+mn-cs"/>
       </a:defRPr>
     </a:lvl1pPr>
-    <a:lvl2pPr marL="457200" algn="l" defTabSz="914400" rtl="0" eaLnBrk="1" latinLnBrk="0" hangingPunct="1">
-      <a:defRPr sz="1800" kern="1200">
+    <a:lvl2pPr marL="457201" algn="l" defTabSz="914399" rtl="0" eaLnBrk="1" latinLnBrk="0" hangingPunct="1">
+      <a:defRPr sz="1799" kern="1200">
         <a:solidFill>
           <a:schemeClr val="tx1"/>
         </a:solidFill>
@@ -33,8 +34,8 @@
         <a:cs typeface="+mn-cs"/>
       </a:defRPr>
     </a:lvl2pPr>
-    <a:lvl3pPr marL="914400" algn="l" defTabSz="914400" rtl="0" eaLnBrk="1" latinLnBrk="0" hangingPunct="1">
-      <a:defRPr sz="1800" kern="1200">
+    <a:lvl3pPr marL="914399" algn="l" defTabSz="914399" rtl="0" eaLnBrk="1" latinLnBrk="0" hangingPunct="1">
+      <a:defRPr sz="1799" kern="1200">
         <a:solidFill>
           <a:schemeClr val="tx1"/>
         </a:solidFill>
@@ -43,8 +44,8 @@
         <a:cs typeface="+mn-cs"/>
       </a:defRPr>
     </a:lvl3pPr>
-    <a:lvl4pPr marL="1371600" algn="l" defTabSz="914400" rtl="0" eaLnBrk="1" latinLnBrk="0" hangingPunct="1">
-      <a:defRPr sz="1800" kern="1200">
+    <a:lvl4pPr marL="1371599" algn="l" defTabSz="914399" rtl="0" eaLnBrk="1" latinLnBrk="0" hangingPunct="1">
+      <a:defRPr sz="1799" kern="1200">
         <a:solidFill>
           <a:schemeClr val="tx1"/>
         </a:solidFill>
@@ -53,8 +54,8 @@
         <a:cs typeface="+mn-cs"/>
       </a:defRPr>
     </a:lvl4pPr>
-    <a:lvl5pPr marL="1828800" algn="l" defTabSz="914400" rtl="0" eaLnBrk="1" latinLnBrk="0" hangingPunct="1">
-      <a:defRPr sz="1800" kern="1200">
+    <a:lvl5pPr marL="1828797" algn="l" defTabSz="914399" rtl="0" eaLnBrk="1" latinLnBrk="0" hangingPunct="1">
+      <a:defRPr sz="1799" kern="1200">
         <a:solidFill>
           <a:schemeClr val="tx1"/>
         </a:solidFill>
@@ -63,8 +64,8 @@
         <a:cs typeface="+mn-cs"/>
       </a:defRPr>
     </a:lvl5pPr>
-    <a:lvl6pPr marL="2286000" algn="l" defTabSz="914400" rtl="0" eaLnBrk="1" latinLnBrk="0" hangingPunct="1">
-      <a:defRPr sz="1800" kern="1200">
+    <a:lvl6pPr marL="2285998" algn="l" defTabSz="914399" rtl="0" eaLnBrk="1" latinLnBrk="0" hangingPunct="1">
+      <a:defRPr sz="1799" kern="1200">
         <a:solidFill>
           <a:schemeClr val="tx1"/>
         </a:solidFill>
@@ -73,8 +74,8 @@
         <a:cs typeface="+mn-cs"/>
       </a:defRPr>
     </a:lvl6pPr>
-    <a:lvl7pPr marL="2743200" algn="l" defTabSz="914400" rtl="0" eaLnBrk="1" latinLnBrk="0" hangingPunct="1">
-      <a:defRPr sz="1800" kern="1200">
+    <a:lvl7pPr marL="2743198" algn="l" defTabSz="914399" rtl="0" eaLnBrk="1" latinLnBrk="0" hangingPunct="1">
+      <a:defRPr sz="1799" kern="1200">
         <a:solidFill>
           <a:schemeClr val="tx1"/>
         </a:solidFill>
@@ -83,8 +84,8 @@
         <a:cs typeface="+mn-cs"/>
       </a:defRPr>
     </a:lvl7pPr>
-    <a:lvl8pPr marL="3200400" algn="l" defTabSz="914400" rtl="0" eaLnBrk="1" latinLnBrk="0" hangingPunct="1">
-      <a:defRPr sz="1800" kern="1200">
+    <a:lvl8pPr marL="3200396" algn="l" defTabSz="914399" rtl="0" eaLnBrk="1" latinLnBrk="0" hangingPunct="1">
+      <a:defRPr sz="1799" kern="1200">
         <a:solidFill>
           <a:schemeClr val="tx1"/>
         </a:solidFill>
@@ -93,8 +94,8 @@
         <a:cs typeface="+mn-cs"/>
       </a:defRPr>
     </a:lvl8pPr>
-    <a:lvl9pPr marL="3657600" algn="l" defTabSz="914400" rtl="0" eaLnBrk="1" latinLnBrk="0" hangingPunct="1">
-      <a:defRPr sz="1800" kern="1200">
+    <a:lvl9pPr marL="3657597" algn="l" defTabSz="914399" rtl="0" eaLnBrk="1" latinLnBrk="0" hangingPunct="1">
+      <a:defRPr sz="1799" kern="1200">
         <a:solidFill>
           <a:schemeClr val="tx1"/>
         </a:solidFill>
@@ -147,8 +148,8 @@
         </p:nvSpPr>
         <p:spPr>
           <a:xfrm>
-            <a:off x="1524000" y="1122363"/>
-            <a:ext cx="9144000" cy="2387600"/>
+            <a:off x="1523999" y="1122364"/>
+            <a:ext cx="9144002" cy="2387600"/>
           </a:xfrm>
         </p:spPr>
         <p:txBody>
@@ -185,8 +186,8 @@
         </p:nvSpPr>
         <p:spPr>
           <a:xfrm>
-            <a:off x="1524000" y="3602038"/>
-            <a:ext cx="9144000" cy="1655762"/>
+            <a:off x="1523999" y="3602039"/>
+            <a:ext cx="9144002" cy="1655762"/>
           </a:xfrm>
         </p:spPr>
         <p:txBody>
@@ -194,39 +195,39 @@
           <a:lstStyle>
             <a:lvl1pPr marL="0" indent="0" algn="ctr">
               <a:buNone/>
-              <a:defRPr sz="2400"/>
+              <a:defRPr sz="2401"/>
             </a:lvl1pPr>
-            <a:lvl2pPr marL="457200" indent="0" algn="ctr">
-              <a:buNone/>
-              <a:defRPr sz="2000"/>
+            <a:lvl2pPr marL="457174" indent="0" algn="ctr">
+              <a:buNone/>
+              <a:defRPr sz="2001"/>
             </a:lvl2pPr>
-            <a:lvl3pPr marL="914400" indent="0" algn="ctr">
-              <a:buNone/>
-              <a:defRPr sz="1800"/>
+            <a:lvl3pPr marL="914348" indent="0" algn="ctr">
+              <a:buNone/>
+              <a:defRPr sz="1801"/>
             </a:lvl3pPr>
-            <a:lvl4pPr marL="1371600" indent="0" algn="ctr">
-              <a:buNone/>
-              <a:defRPr sz="1600"/>
+            <a:lvl4pPr marL="1371523" indent="0" algn="ctr">
+              <a:buNone/>
+              <a:defRPr sz="1598"/>
             </a:lvl4pPr>
-            <a:lvl5pPr marL="1828800" indent="0" algn="ctr">
-              <a:buNone/>
-              <a:defRPr sz="1600"/>
+            <a:lvl5pPr marL="1828700" indent="0" algn="ctr">
+              <a:buNone/>
+              <a:defRPr sz="1598"/>
             </a:lvl5pPr>
-            <a:lvl6pPr marL="2286000" indent="0" algn="ctr">
-              <a:buNone/>
-              <a:defRPr sz="1600"/>
+            <a:lvl6pPr marL="2285875" indent="0" algn="ctr">
+              <a:buNone/>
+              <a:defRPr sz="1598"/>
             </a:lvl6pPr>
-            <a:lvl7pPr marL="2743200" indent="0" algn="ctr">
-              <a:buNone/>
-              <a:defRPr sz="1600"/>
+            <a:lvl7pPr marL="2743049" indent="0" algn="ctr">
+              <a:buNone/>
+              <a:defRPr sz="1598"/>
             </a:lvl7pPr>
-            <a:lvl8pPr marL="3200400" indent="0" algn="ctr">
-              <a:buNone/>
-              <a:defRPr sz="1600"/>
+            <a:lvl8pPr marL="3200223" indent="0" algn="ctr">
+              <a:buNone/>
+              <a:defRPr sz="1598"/>
             </a:lvl8pPr>
-            <a:lvl9pPr marL="3657600" indent="0" algn="ctr">
-              <a:buNone/>
-              <a:defRPr sz="1600"/>
+            <a:lvl9pPr marL="3657397" indent="0" algn="ctr">
+              <a:buNone/>
+              <a:defRPr sz="1598"/>
             </a:lvl9pPr>
           </a:lstStyle>
           <a:p>
@@ -569,7 +570,7 @@
         </p:nvSpPr>
         <p:spPr>
           <a:xfrm>
-            <a:off x="8724900" y="365125"/>
+            <a:off x="8724902" y="365127"/>
             <a:ext cx="2628900" cy="5811838"/>
           </a:xfrm>
         </p:spPr>
@@ -603,8 +604,8 @@
         </p:nvSpPr>
         <p:spPr>
           <a:xfrm>
-            <a:off x="838200" y="365125"/>
-            <a:ext cx="7734300" cy="5811838"/>
+            <a:off x="838202" y="365127"/>
+            <a:ext cx="7734298" cy="5811838"/>
           </a:xfrm>
         </p:spPr>
         <p:txBody>
@@ -979,7 +980,7 @@
         </p:nvSpPr>
         <p:spPr>
           <a:xfrm>
-            <a:off x="831850" y="1709738"/>
+            <a:off x="831851" y="1709740"/>
             <a:ext cx="10515600" cy="2852737"/>
           </a:xfrm>
         </p:spPr>
@@ -1017,7 +1018,7 @@
         </p:nvSpPr>
         <p:spPr>
           <a:xfrm>
-            <a:off x="831850" y="4589463"/>
+            <a:off x="831851" y="4589463"/>
             <a:ext cx="10515600" cy="1500187"/>
           </a:xfrm>
         </p:spPr>
@@ -1026,7 +1027,7 @@
           <a:lstStyle>
             <a:lvl1pPr marL="0" indent="0">
               <a:buNone/>
-              <a:defRPr sz="2400">
+              <a:defRPr sz="2401">
                 <a:solidFill>
                   <a:schemeClr val="tx1">
                     <a:tint val="75000"/>
@@ -1034,9 +1035,9 @@
                 </a:solidFill>
               </a:defRPr>
             </a:lvl1pPr>
-            <a:lvl2pPr marL="457200" indent="0">
-              <a:buNone/>
-              <a:defRPr sz="2000">
+            <a:lvl2pPr marL="457174" indent="0">
+              <a:buNone/>
+              <a:defRPr sz="2001">
                 <a:solidFill>
                   <a:schemeClr val="tx1">
                     <a:tint val="75000"/>
@@ -1044,9 +1045,9 @@
                 </a:solidFill>
               </a:defRPr>
             </a:lvl2pPr>
-            <a:lvl3pPr marL="914400" indent="0">
-              <a:buNone/>
-              <a:defRPr sz="1800">
+            <a:lvl3pPr marL="914348" indent="0">
+              <a:buNone/>
+              <a:defRPr sz="1801">
                 <a:solidFill>
                   <a:schemeClr val="tx1">
                     <a:tint val="75000"/>
@@ -1054,9 +1055,9 @@
                 </a:solidFill>
               </a:defRPr>
             </a:lvl3pPr>
-            <a:lvl4pPr marL="1371600" indent="0">
-              <a:buNone/>
-              <a:defRPr sz="1600">
+            <a:lvl4pPr marL="1371523" indent="0">
+              <a:buNone/>
+              <a:defRPr sz="1598">
                 <a:solidFill>
                   <a:schemeClr val="tx1">
                     <a:tint val="75000"/>
@@ -1064,9 +1065,9 @@
                 </a:solidFill>
               </a:defRPr>
             </a:lvl4pPr>
-            <a:lvl5pPr marL="1828800" indent="0">
-              <a:buNone/>
-              <a:defRPr sz="1600">
+            <a:lvl5pPr marL="1828700" indent="0">
+              <a:buNone/>
+              <a:defRPr sz="1598">
                 <a:solidFill>
                   <a:schemeClr val="tx1">
                     <a:tint val="75000"/>
@@ -1074,9 +1075,9 @@
                 </a:solidFill>
               </a:defRPr>
             </a:lvl5pPr>
-            <a:lvl6pPr marL="2286000" indent="0">
-              <a:buNone/>
-              <a:defRPr sz="1600">
+            <a:lvl6pPr marL="2285875" indent="0">
+              <a:buNone/>
+              <a:defRPr sz="1598">
                 <a:solidFill>
                   <a:schemeClr val="tx1">
                     <a:tint val="75000"/>
@@ -1084,9 +1085,9 @@
                 </a:solidFill>
               </a:defRPr>
             </a:lvl6pPr>
-            <a:lvl7pPr marL="2743200" indent="0">
-              <a:buNone/>
-              <a:defRPr sz="1600">
+            <a:lvl7pPr marL="2743049" indent="0">
+              <a:buNone/>
+              <a:defRPr sz="1598">
                 <a:solidFill>
                   <a:schemeClr val="tx1">
                     <a:tint val="75000"/>
@@ -1094,9 +1095,9 @@
                 </a:solidFill>
               </a:defRPr>
             </a:lvl7pPr>
-            <a:lvl8pPr marL="3200400" indent="0">
-              <a:buNone/>
-              <a:defRPr sz="1600">
+            <a:lvl8pPr marL="3200223" indent="0">
+              <a:buNone/>
+              <a:defRPr sz="1598">
                 <a:solidFill>
                   <a:schemeClr val="tx1">
                     <a:tint val="75000"/>
@@ -1104,9 +1105,9 @@
                 </a:solidFill>
               </a:defRPr>
             </a:lvl8pPr>
-            <a:lvl9pPr marL="3657600" indent="0">
-              <a:buNone/>
-              <a:defRPr sz="1600">
+            <a:lvl9pPr marL="3657397" indent="0">
+              <a:buNone/>
+              <a:defRPr sz="1598">
                 <a:solidFill>
                   <a:schemeClr val="tx1">
                     <a:tint val="75000"/>
@@ -1284,8 +1285,8 @@
         </p:nvSpPr>
         <p:spPr>
           <a:xfrm>
-            <a:off x="838200" y="1825625"/>
-            <a:ext cx="5181600" cy="4351338"/>
+            <a:off x="838202" y="1825625"/>
+            <a:ext cx="5181599" cy="4351337"/>
           </a:xfrm>
         </p:spPr>
         <p:txBody>
@@ -1347,8 +1348,8 @@
         </p:nvSpPr>
         <p:spPr>
           <a:xfrm>
-            <a:off x="6172200" y="1825625"/>
-            <a:ext cx="5181600" cy="4351338"/>
+            <a:off x="6172202" y="1825625"/>
+            <a:ext cx="5181599" cy="4351337"/>
           </a:xfrm>
         </p:spPr>
         <p:txBody>
@@ -1523,8 +1524,8 @@
         </p:nvSpPr>
         <p:spPr>
           <a:xfrm>
-            <a:off x="839788" y="365125"/>
-            <a:ext cx="10515600" cy="1325563"/>
+            <a:off x="839788" y="365127"/>
+            <a:ext cx="10515600" cy="1325564"/>
           </a:xfrm>
         </p:spPr>
         <p:txBody>
@@ -1557,7 +1558,7 @@
         </p:nvSpPr>
         <p:spPr>
           <a:xfrm>
-            <a:off x="839788" y="1681163"/>
+            <a:off x="839790" y="1681162"/>
             <a:ext cx="5157787" cy="823912"/>
           </a:xfrm>
         </p:spPr>
@@ -1566,39 +1567,39 @@
           <a:lstStyle>
             <a:lvl1pPr marL="0" indent="0">
               <a:buNone/>
-              <a:defRPr sz="2400" b="1"/>
+              <a:defRPr sz="2401" b="1"/>
             </a:lvl1pPr>
-            <a:lvl2pPr marL="457200" indent="0">
-              <a:buNone/>
-              <a:defRPr sz="2000" b="1"/>
+            <a:lvl2pPr marL="457174" indent="0">
+              <a:buNone/>
+              <a:defRPr sz="2001" b="1"/>
             </a:lvl2pPr>
-            <a:lvl3pPr marL="914400" indent="0">
-              <a:buNone/>
-              <a:defRPr sz="1800" b="1"/>
+            <a:lvl3pPr marL="914348" indent="0">
+              <a:buNone/>
+              <a:defRPr sz="1801" b="1"/>
             </a:lvl3pPr>
-            <a:lvl4pPr marL="1371600" indent="0">
-              <a:buNone/>
-              <a:defRPr sz="1600" b="1"/>
+            <a:lvl4pPr marL="1371523" indent="0">
+              <a:buNone/>
+              <a:defRPr sz="1598" b="1"/>
             </a:lvl4pPr>
-            <a:lvl5pPr marL="1828800" indent="0">
-              <a:buNone/>
-              <a:defRPr sz="1600" b="1"/>
+            <a:lvl5pPr marL="1828700" indent="0">
+              <a:buNone/>
+              <a:defRPr sz="1598" b="1"/>
             </a:lvl5pPr>
-            <a:lvl6pPr marL="2286000" indent="0">
-              <a:buNone/>
-              <a:defRPr sz="1600" b="1"/>
+            <a:lvl6pPr marL="2285875" indent="0">
+              <a:buNone/>
+              <a:defRPr sz="1598" b="1"/>
             </a:lvl6pPr>
-            <a:lvl7pPr marL="2743200" indent="0">
-              <a:buNone/>
-              <a:defRPr sz="1600" b="1"/>
+            <a:lvl7pPr marL="2743049" indent="0">
+              <a:buNone/>
+              <a:defRPr sz="1598" b="1"/>
             </a:lvl7pPr>
-            <a:lvl8pPr marL="3200400" indent="0">
-              <a:buNone/>
-              <a:defRPr sz="1600" b="1"/>
+            <a:lvl8pPr marL="3200223" indent="0">
+              <a:buNone/>
+              <a:defRPr sz="1598" b="1"/>
             </a:lvl8pPr>
-            <a:lvl9pPr marL="3657600" indent="0">
-              <a:buNone/>
-              <a:defRPr sz="1600" b="1"/>
+            <a:lvl9pPr marL="3657397" indent="0">
+              <a:buNone/>
+              <a:defRPr sz="1598" b="1"/>
             </a:lvl9pPr>
           </a:lstStyle>
           <a:p>
@@ -1628,8 +1629,8 @@
         </p:nvSpPr>
         <p:spPr>
           <a:xfrm>
-            <a:off x="839788" y="2505075"/>
-            <a:ext cx="5157787" cy="3684588"/>
+            <a:off x="839790" y="2505075"/>
+            <a:ext cx="5157787" cy="3684589"/>
           </a:xfrm>
         </p:spPr>
         <p:txBody>
@@ -1691,8 +1692,8 @@
         </p:nvSpPr>
         <p:spPr>
           <a:xfrm>
-            <a:off x="6172200" y="1681163"/>
-            <a:ext cx="5183188" cy="823912"/>
+            <a:off x="6172201" y="1681162"/>
+            <a:ext cx="5183187" cy="823912"/>
           </a:xfrm>
         </p:spPr>
         <p:txBody>
@@ -1700,39 +1701,39 @@
           <a:lstStyle>
             <a:lvl1pPr marL="0" indent="0">
               <a:buNone/>
-              <a:defRPr sz="2400" b="1"/>
+              <a:defRPr sz="2401" b="1"/>
             </a:lvl1pPr>
-            <a:lvl2pPr marL="457200" indent="0">
-              <a:buNone/>
-              <a:defRPr sz="2000" b="1"/>
+            <a:lvl2pPr marL="457174" indent="0">
+              <a:buNone/>
+              <a:defRPr sz="2001" b="1"/>
             </a:lvl2pPr>
-            <a:lvl3pPr marL="914400" indent="0">
-              <a:buNone/>
-              <a:defRPr sz="1800" b="1"/>
+            <a:lvl3pPr marL="914348" indent="0">
+              <a:buNone/>
+              <a:defRPr sz="1801" b="1"/>
             </a:lvl3pPr>
-            <a:lvl4pPr marL="1371600" indent="0">
-              <a:buNone/>
-              <a:defRPr sz="1600" b="1"/>
+            <a:lvl4pPr marL="1371523" indent="0">
+              <a:buNone/>
+              <a:defRPr sz="1598" b="1"/>
             </a:lvl4pPr>
-            <a:lvl5pPr marL="1828800" indent="0">
-              <a:buNone/>
-              <a:defRPr sz="1600" b="1"/>
+            <a:lvl5pPr marL="1828700" indent="0">
+              <a:buNone/>
+              <a:defRPr sz="1598" b="1"/>
             </a:lvl5pPr>
-            <a:lvl6pPr marL="2286000" indent="0">
-              <a:buNone/>
-              <a:defRPr sz="1600" b="1"/>
+            <a:lvl6pPr marL="2285875" indent="0">
+              <a:buNone/>
+              <a:defRPr sz="1598" b="1"/>
             </a:lvl6pPr>
-            <a:lvl7pPr marL="2743200" indent="0">
-              <a:buNone/>
-              <a:defRPr sz="1600" b="1"/>
+            <a:lvl7pPr marL="2743049" indent="0">
+              <a:buNone/>
+              <a:defRPr sz="1598" b="1"/>
             </a:lvl7pPr>
-            <a:lvl8pPr marL="3200400" indent="0">
-              <a:buNone/>
-              <a:defRPr sz="1600" b="1"/>
+            <a:lvl8pPr marL="3200223" indent="0">
+              <a:buNone/>
+              <a:defRPr sz="1598" b="1"/>
             </a:lvl8pPr>
-            <a:lvl9pPr marL="3657600" indent="0">
-              <a:buNone/>
-              <a:defRPr sz="1600" b="1"/>
+            <a:lvl9pPr marL="3657397" indent="0">
+              <a:buNone/>
+              <a:defRPr sz="1598" b="1"/>
             </a:lvl9pPr>
           </a:lstStyle>
           <a:p>
@@ -1762,8 +1763,8 @@
         </p:nvSpPr>
         <p:spPr>
           <a:xfrm>
-            <a:off x="6172200" y="2505075"/>
-            <a:ext cx="5183188" cy="3684588"/>
+            <a:off x="6172201" y="2505075"/>
+            <a:ext cx="5183187" cy="3684589"/>
           </a:xfrm>
         </p:spPr>
         <p:txBody>
@@ -2193,8 +2194,8 @@
         </p:nvSpPr>
         <p:spPr>
           <a:xfrm>
-            <a:off x="839788" y="457200"/>
-            <a:ext cx="3932237" cy="1600200"/>
+            <a:off x="839790" y="457201"/>
+            <a:ext cx="3932238" cy="1600200"/>
           </a:xfrm>
         </p:spPr>
         <p:txBody>
@@ -2231,8 +2232,8 @@
         </p:nvSpPr>
         <p:spPr>
           <a:xfrm>
-            <a:off x="5183188" y="987425"/>
-            <a:ext cx="6172200" cy="4873625"/>
+            <a:off x="5183187" y="987426"/>
+            <a:ext cx="6172201" cy="4873625"/>
           </a:xfrm>
         </p:spPr>
         <p:txBody>
@@ -2245,25 +2246,25 @@
               <a:defRPr sz="2800"/>
             </a:lvl2pPr>
             <a:lvl3pPr>
-              <a:defRPr sz="2400"/>
+              <a:defRPr sz="2401"/>
             </a:lvl3pPr>
             <a:lvl4pPr>
-              <a:defRPr sz="2000"/>
+              <a:defRPr sz="2001"/>
             </a:lvl4pPr>
             <a:lvl5pPr>
-              <a:defRPr sz="2000"/>
+              <a:defRPr sz="2001"/>
             </a:lvl5pPr>
             <a:lvl6pPr>
-              <a:defRPr sz="2000"/>
+              <a:defRPr sz="2001"/>
             </a:lvl6pPr>
             <a:lvl7pPr>
-              <a:defRPr sz="2000"/>
+              <a:defRPr sz="2001"/>
             </a:lvl7pPr>
             <a:lvl8pPr>
-              <a:defRPr sz="2000"/>
+              <a:defRPr sz="2001"/>
             </a:lvl8pPr>
             <a:lvl9pPr>
-              <a:defRPr sz="2000"/>
+              <a:defRPr sz="2001"/>
             </a:lvl9pPr>
           </a:lstStyle>
           <a:p>
@@ -2322,8 +2323,8 @@
         </p:nvSpPr>
         <p:spPr>
           <a:xfrm>
-            <a:off x="839788" y="2057400"/>
-            <a:ext cx="3932237" cy="3811588"/>
+            <a:off x="839790" y="2057400"/>
+            <a:ext cx="3932238" cy="3811589"/>
           </a:xfrm>
         </p:spPr>
         <p:txBody>
@@ -2331,39 +2332,39 @@
           <a:lstStyle>
             <a:lvl1pPr marL="0" indent="0">
               <a:buNone/>
-              <a:defRPr sz="1600"/>
+              <a:defRPr sz="1598"/>
             </a:lvl1pPr>
-            <a:lvl2pPr marL="457200" indent="0">
-              <a:buNone/>
-              <a:defRPr sz="1400"/>
+            <a:lvl2pPr marL="457174" indent="0">
+              <a:buNone/>
+              <a:defRPr sz="1399"/>
             </a:lvl2pPr>
-            <a:lvl3pPr marL="914400" indent="0">
-              <a:buNone/>
-              <a:defRPr sz="1200"/>
+            <a:lvl3pPr marL="914348" indent="0">
+              <a:buNone/>
+              <a:defRPr sz="1199"/>
             </a:lvl3pPr>
-            <a:lvl4pPr marL="1371600" indent="0">
-              <a:buNone/>
-              <a:defRPr sz="1000"/>
+            <a:lvl4pPr marL="1371523" indent="0">
+              <a:buNone/>
+              <a:defRPr sz="999"/>
             </a:lvl4pPr>
-            <a:lvl5pPr marL="1828800" indent="0">
-              <a:buNone/>
-              <a:defRPr sz="1000"/>
+            <a:lvl5pPr marL="1828700" indent="0">
+              <a:buNone/>
+              <a:defRPr sz="999"/>
             </a:lvl5pPr>
-            <a:lvl6pPr marL="2286000" indent="0">
-              <a:buNone/>
-              <a:defRPr sz="1000"/>
+            <a:lvl6pPr marL="2285875" indent="0">
+              <a:buNone/>
+              <a:defRPr sz="999"/>
             </a:lvl6pPr>
-            <a:lvl7pPr marL="2743200" indent="0">
-              <a:buNone/>
-              <a:defRPr sz="1000"/>
+            <a:lvl7pPr marL="2743049" indent="0">
+              <a:buNone/>
+              <a:defRPr sz="999"/>
             </a:lvl7pPr>
-            <a:lvl8pPr marL="3200400" indent="0">
-              <a:buNone/>
-              <a:defRPr sz="1000"/>
+            <a:lvl8pPr marL="3200223" indent="0">
+              <a:buNone/>
+              <a:defRPr sz="999"/>
             </a:lvl8pPr>
-            <a:lvl9pPr marL="3657600" indent="0">
-              <a:buNone/>
-              <a:defRPr sz="1000"/>
+            <a:lvl9pPr marL="3657397" indent="0">
+              <a:buNone/>
+              <a:defRPr sz="999"/>
             </a:lvl9pPr>
           </a:lstStyle>
           <a:p>
@@ -2506,8 +2507,8 @@
         </p:nvSpPr>
         <p:spPr>
           <a:xfrm>
-            <a:off x="839788" y="457200"/>
-            <a:ext cx="3932237" cy="1600200"/>
+            <a:off x="839790" y="457201"/>
+            <a:ext cx="3932238" cy="1600200"/>
           </a:xfrm>
         </p:spPr>
         <p:txBody>
@@ -2544,8 +2545,8 @@
         </p:nvSpPr>
         <p:spPr>
           <a:xfrm>
-            <a:off x="5183188" y="987425"/>
-            <a:ext cx="6172200" cy="4873625"/>
+            <a:off x="5183187" y="987426"/>
+            <a:ext cx="6172201" cy="4873625"/>
           </a:xfrm>
         </p:spPr>
         <p:txBody>
@@ -2555,37 +2556,37 @@
               <a:buNone/>
               <a:defRPr sz="3200"/>
             </a:lvl1pPr>
-            <a:lvl2pPr marL="457200" indent="0">
+            <a:lvl2pPr marL="457174" indent="0">
               <a:buNone/>
               <a:defRPr sz="2800"/>
             </a:lvl2pPr>
-            <a:lvl3pPr marL="914400" indent="0">
-              <a:buNone/>
-              <a:defRPr sz="2400"/>
+            <a:lvl3pPr marL="914348" indent="0">
+              <a:buNone/>
+              <a:defRPr sz="2401"/>
             </a:lvl3pPr>
-            <a:lvl4pPr marL="1371600" indent="0">
-              <a:buNone/>
-              <a:defRPr sz="2000"/>
+            <a:lvl4pPr marL="1371523" indent="0">
+              <a:buNone/>
+              <a:defRPr sz="2001"/>
             </a:lvl4pPr>
-            <a:lvl5pPr marL="1828800" indent="0">
-              <a:buNone/>
-              <a:defRPr sz="2000"/>
+            <a:lvl5pPr marL="1828700" indent="0">
+              <a:buNone/>
+              <a:defRPr sz="2001"/>
             </a:lvl5pPr>
-            <a:lvl6pPr marL="2286000" indent="0">
-              <a:buNone/>
-              <a:defRPr sz="2000"/>
+            <a:lvl6pPr marL="2285875" indent="0">
+              <a:buNone/>
+              <a:defRPr sz="2001"/>
             </a:lvl6pPr>
-            <a:lvl7pPr marL="2743200" indent="0">
-              <a:buNone/>
-              <a:defRPr sz="2000"/>
+            <a:lvl7pPr marL="2743049" indent="0">
+              <a:buNone/>
+              <a:defRPr sz="2001"/>
             </a:lvl7pPr>
-            <a:lvl8pPr marL="3200400" indent="0">
-              <a:buNone/>
-              <a:defRPr sz="2000"/>
+            <a:lvl8pPr marL="3200223" indent="0">
+              <a:buNone/>
+              <a:defRPr sz="2001"/>
             </a:lvl8pPr>
-            <a:lvl9pPr marL="3657600" indent="0">
-              <a:buNone/>
-              <a:defRPr sz="2000"/>
+            <a:lvl9pPr marL="3657397" indent="0">
+              <a:buNone/>
+              <a:defRPr sz="2001"/>
             </a:lvl9pPr>
           </a:lstStyle>
           <a:p>
@@ -2611,8 +2612,8 @@
         </p:nvSpPr>
         <p:spPr>
           <a:xfrm>
-            <a:off x="839788" y="2057400"/>
-            <a:ext cx="3932237" cy="3811588"/>
+            <a:off x="839790" y="2057400"/>
+            <a:ext cx="3932238" cy="3811589"/>
           </a:xfrm>
         </p:spPr>
         <p:txBody>
@@ -2620,39 +2621,39 @@
           <a:lstStyle>
             <a:lvl1pPr marL="0" indent="0">
               <a:buNone/>
-              <a:defRPr sz="1600"/>
+              <a:defRPr sz="1598"/>
             </a:lvl1pPr>
-            <a:lvl2pPr marL="457200" indent="0">
-              <a:buNone/>
-              <a:defRPr sz="1400"/>
+            <a:lvl2pPr marL="457174" indent="0">
+              <a:buNone/>
+              <a:defRPr sz="1399"/>
             </a:lvl2pPr>
-            <a:lvl3pPr marL="914400" indent="0">
-              <a:buNone/>
-              <a:defRPr sz="1200"/>
+            <a:lvl3pPr marL="914348" indent="0">
+              <a:buNone/>
+              <a:defRPr sz="1199"/>
             </a:lvl3pPr>
-            <a:lvl4pPr marL="1371600" indent="0">
-              <a:buNone/>
-              <a:defRPr sz="1000"/>
+            <a:lvl4pPr marL="1371523" indent="0">
+              <a:buNone/>
+              <a:defRPr sz="999"/>
             </a:lvl4pPr>
-            <a:lvl5pPr marL="1828800" indent="0">
-              <a:buNone/>
-              <a:defRPr sz="1000"/>
+            <a:lvl5pPr marL="1828700" indent="0">
+              <a:buNone/>
+              <a:defRPr sz="999"/>
             </a:lvl5pPr>
-            <a:lvl6pPr marL="2286000" indent="0">
-              <a:buNone/>
-              <a:defRPr sz="1000"/>
+            <a:lvl6pPr marL="2285875" indent="0">
+              <a:buNone/>
+              <a:defRPr sz="999"/>
             </a:lvl6pPr>
-            <a:lvl7pPr marL="2743200" indent="0">
-              <a:buNone/>
-              <a:defRPr sz="1000"/>
+            <a:lvl7pPr marL="2743049" indent="0">
+              <a:buNone/>
+              <a:defRPr sz="999"/>
             </a:lvl7pPr>
-            <a:lvl8pPr marL="3200400" indent="0">
-              <a:buNone/>
-              <a:defRPr sz="1000"/>
+            <a:lvl8pPr marL="3200223" indent="0">
+              <a:buNone/>
+              <a:defRPr sz="999"/>
             </a:lvl8pPr>
-            <a:lvl9pPr marL="3657600" indent="0">
-              <a:buNone/>
-              <a:defRPr sz="1000"/>
+            <a:lvl9pPr marL="3657397" indent="0">
+              <a:buNone/>
+              <a:defRPr sz="999"/>
             </a:lvl9pPr>
           </a:lstStyle>
           <a:p>
@@ -2800,8 +2801,8 @@
         </p:nvSpPr>
         <p:spPr>
           <a:xfrm>
-            <a:off x="838200" y="365125"/>
-            <a:ext cx="10515600" cy="1325563"/>
+            <a:off x="838200" y="365127"/>
+            <a:ext cx="10515600" cy="1325564"/>
           </a:xfrm>
           <a:prstGeom prst="rect">
             <a:avLst/>
@@ -2840,7 +2841,7 @@
         <p:spPr>
           <a:xfrm>
             <a:off x="838200" y="1825625"/>
-            <a:ext cx="10515600" cy="4351338"/>
+            <a:ext cx="10515600" cy="4351337"/>
           </a:xfrm>
           <a:prstGeom prst="rect">
             <a:avLst/>
@@ -2907,8 +2908,8 @@
         </p:nvSpPr>
         <p:spPr>
           <a:xfrm>
-            <a:off x="838200" y="6356350"/>
-            <a:ext cx="2743200" cy="365125"/>
+            <a:off x="838202" y="6356351"/>
+            <a:ext cx="2743199" cy="365126"/>
           </a:xfrm>
           <a:prstGeom prst="rect">
             <a:avLst/>
@@ -2918,7 +2919,7 @@
           <a:bodyPr vert="horz" lIns="91440" tIns="45720" rIns="91440" bIns="45720" rtlCol="0" anchor="ctr"/>
           <a:lstStyle>
             <a:lvl1pPr algn="l">
-              <a:defRPr sz="1200">
+              <a:defRPr sz="1199">
                 <a:solidFill>
                   <a:schemeClr val="tx1">
                     <a:tint val="75000"/>
@@ -2954,8 +2955,8 @@
         </p:nvSpPr>
         <p:spPr>
           <a:xfrm>
-            <a:off x="4038600" y="6356350"/>
-            <a:ext cx="4114800" cy="365125"/>
+            <a:off x="4038600" y="6356351"/>
+            <a:ext cx="4114800" cy="365126"/>
           </a:xfrm>
           <a:prstGeom prst="rect">
             <a:avLst/>
@@ -2965,7 +2966,7 @@
           <a:bodyPr vert="horz" lIns="91440" tIns="45720" rIns="91440" bIns="45720" rtlCol="0" anchor="ctr"/>
           <a:lstStyle>
             <a:lvl1pPr algn="ctr">
-              <a:defRPr sz="1200">
+              <a:defRPr sz="1199">
                 <a:solidFill>
                   <a:schemeClr val="tx1">
                     <a:tint val="75000"/>
@@ -2997,8 +2998,8 @@
         </p:nvSpPr>
         <p:spPr>
           <a:xfrm>
-            <a:off x="8610600" y="6356350"/>
-            <a:ext cx="2743200" cy="365125"/>
+            <a:off x="8610602" y="6356351"/>
+            <a:ext cx="2743199" cy="365126"/>
           </a:xfrm>
           <a:prstGeom prst="rect">
             <a:avLst/>
@@ -3008,7 +3009,7 @@
           <a:bodyPr vert="horz" lIns="91440" tIns="45720" rIns="91440" bIns="45720" rtlCol="0" anchor="ctr"/>
           <a:lstStyle>
             <a:lvl1pPr algn="r">
-              <a:defRPr sz="1200">
+              <a:defRPr sz="1199">
                 <a:solidFill>
                   <a:schemeClr val="tx1">
                     <a:tint val="75000"/>
@@ -3049,7 +3050,7 @@
   </p:sldLayoutIdLst>
   <p:txStyles>
     <p:titleStyle>
-      <a:lvl1pPr algn="l" defTabSz="914400" rtl="0" eaLnBrk="1" latinLnBrk="0" hangingPunct="1">
+      <a:lvl1pPr algn="l" defTabSz="914348" rtl="0" eaLnBrk="1" latinLnBrk="0" hangingPunct="1">
         <a:lnSpc>
           <a:spcPct val="90000"/>
         </a:lnSpc>
@@ -3057,7 +3058,7 @@
           <a:spcPct val="0"/>
         </a:spcBef>
         <a:buNone/>
-        <a:defRPr sz="4400" kern="1200">
+        <a:defRPr sz="4399" kern="1200">
           <a:solidFill>
             <a:schemeClr val="tx1"/>
           </a:solidFill>
@@ -3068,12 +3069,12 @@
       </a:lvl1pPr>
     </p:titleStyle>
     <p:bodyStyle>
-      <a:lvl1pPr marL="228600" indent="-228600" algn="l" defTabSz="914400" rtl="0" eaLnBrk="1" latinLnBrk="0" hangingPunct="1">
+      <a:lvl1pPr marL="228589" indent="-228589" algn="l" defTabSz="914348" rtl="0" eaLnBrk="1" latinLnBrk="0" hangingPunct="1">
         <a:lnSpc>
           <a:spcPct val="90000"/>
         </a:lnSpc>
         <a:spcBef>
-          <a:spcPts val="1000"/>
+          <a:spcPts val="999"/>
         </a:spcBef>
         <a:buFont typeface="Arial" panose="020B0604020202020204" pitchFamily="34" charset="0"/>
         <a:buChar char="•"/>
@@ -3086,16 +3087,16 @@
           <a:cs typeface="+mn-cs"/>
         </a:defRPr>
       </a:lvl1pPr>
-      <a:lvl2pPr marL="685800" indent="-228600" algn="l" defTabSz="914400" rtl="0" eaLnBrk="1" latinLnBrk="0" hangingPunct="1">
+      <a:lvl2pPr marL="685763" indent="-228589" algn="l" defTabSz="914348" rtl="0" eaLnBrk="1" latinLnBrk="0" hangingPunct="1">
         <a:lnSpc>
           <a:spcPct val="90000"/>
         </a:lnSpc>
         <a:spcBef>
-          <a:spcPts val="500"/>
+          <a:spcPts val="501"/>
         </a:spcBef>
         <a:buFont typeface="Arial" panose="020B0604020202020204" pitchFamily="34" charset="0"/>
         <a:buChar char="•"/>
-        <a:defRPr sz="2400" kern="1200">
+        <a:defRPr sz="2401" kern="1200">
           <a:solidFill>
             <a:schemeClr val="tx1"/>
           </a:solidFill>
@@ -3104,16 +3105,16 @@
           <a:cs typeface="+mn-cs"/>
         </a:defRPr>
       </a:lvl2pPr>
-      <a:lvl3pPr marL="1143000" indent="-228600" algn="l" defTabSz="914400" rtl="0" eaLnBrk="1" latinLnBrk="0" hangingPunct="1">
+      <a:lvl3pPr marL="1142937" indent="-228589" algn="l" defTabSz="914348" rtl="0" eaLnBrk="1" latinLnBrk="0" hangingPunct="1">
         <a:lnSpc>
           <a:spcPct val="90000"/>
         </a:lnSpc>
         <a:spcBef>
-          <a:spcPts val="500"/>
+          <a:spcPts val="501"/>
         </a:spcBef>
         <a:buFont typeface="Arial" panose="020B0604020202020204" pitchFamily="34" charset="0"/>
         <a:buChar char="•"/>
-        <a:defRPr sz="2000" kern="1200">
+        <a:defRPr sz="2001" kern="1200">
           <a:solidFill>
             <a:schemeClr val="tx1"/>
           </a:solidFill>
@@ -3122,16 +3123,16 @@
           <a:cs typeface="+mn-cs"/>
         </a:defRPr>
       </a:lvl3pPr>
-      <a:lvl4pPr marL="1600200" indent="-228600" algn="l" defTabSz="914400" rtl="0" eaLnBrk="1" latinLnBrk="0" hangingPunct="1">
+      <a:lvl4pPr marL="1600112" indent="-228589" algn="l" defTabSz="914348" rtl="0" eaLnBrk="1" latinLnBrk="0" hangingPunct="1">
         <a:lnSpc>
           <a:spcPct val="90000"/>
         </a:lnSpc>
         <a:spcBef>
-          <a:spcPts val="500"/>
+          <a:spcPts val="501"/>
         </a:spcBef>
         <a:buFont typeface="Arial" panose="020B0604020202020204" pitchFamily="34" charset="0"/>
         <a:buChar char="•"/>
-        <a:defRPr sz="1800" kern="1200">
+        <a:defRPr sz="1801" kern="1200">
           <a:solidFill>
             <a:schemeClr val="tx1"/>
           </a:solidFill>
@@ -3140,16 +3141,16 @@
           <a:cs typeface="+mn-cs"/>
         </a:defRPr>
       </a:lvl4pPr>
-      <a:lvl5pPr marL="2057400" indent="-228600" algn="l" defTabSz="914400" rtl="0" eaLnBrk="1" latinLnBrk="0" hangingPunct="1">
+      <a:lvl5pPr marL="2057286" indent="-228589" algn="l" defTabSz="914348" rtl="0" eaLnBrk="1" latinLnBrk="0" hangingPunct="1">
         <a:lnSpc>
           <a:spcPct val="90000"/>
         </a:lnSpc>
         <a:spcBef>
-          <a:spcPts val="500"/>
+          <a:spcPts val="501"/>
         </a:spcBef>
         <a:buFont typeface="Arial" panose="020B0604020202020204" pitchFamily="34" charset="0"/>
         <a:buChar char="•"/>
-        <a:defRPr sz="1800" kern="1200">
+        <a:defRPr sz="1801" kern="1200">
           <a:solidFill>
             <a:schemeClr val="tx1"/>
           </a:solidFill>
@@ -3158,16 +3159,16 @@
           <a:cs typeface="+mn-cs"/>
         </a:defRPr>
       </a:lvl5pPr>
-      <a:lvl6pPr marL="2514600" indent="-228600" algn="l" defTabSz="914400" rtl="0" eaLnBrk="1" latinLnBrk="0" hangingPunct="1">
+      <a:lvl6pPr marL="2514460" indent="-228589" algn="l" defTabSz="914348" rtl="0" eaLnBrk="1" latinLnBrk="0" hangingPunct="1">
         <a:lnSpc>
           <a:spcPct val="90000"/>
         </a:lnSpc>
         <a:spcBef>
-          <a:spcPts val="500"/>
+          <a:spcPts val="501"/>
         </a:spcBef>
         <a:buFont typeface="Arial" panose="020B0604020202020204" pitchFamily="34" charset="0"/>
         <a:buChar char="•"/>
-        <a:defRPr sz="1800" kern="1200">
+        <a:defRPr sz="1801" kern="1200">
           <a:solidFill>
             <a:schemeClr val="tx1"/>
           </a:solidFill>
@@ -3176,16 +3177,16 @@
           <a:cs typeface="+mn-cs"/>
         </a:defRPr>
       </a:lvl6pPr>
-      <a:lvl7pPr marL="2971800" indent="-228600" algn="l" defTabSz="914400" rtl="0" eaLnBrk="1" latinLnBrk="0" hangingPunct="1">
+      <a:lvl7pPr marL="2971638" indent="-228589" algn="l" defTabSz="914348" rtl="0" eaLnBrk="1" latinLnBrk="0" hangingPunct="1">
         <a:lnSpc>
           <a:spcPct val="90000"/>
         </a:lnSpc>
         <a:spcBef>
-          <a:spcPts val="500"/>
+          <a:spcPts val="501"/>
         </a:spcBef>
         <a:buFont typeface="Arial" panose="020B0604020202020204" pitchFamily="34" charset="0"/>
         <a:buChar char="•"/>
-        <a:defRPr sz="1800" kern="1200">
+        <a:defRPr sz="1801" kern="1200">
           <a:solidFill>
             <a:schemeClr val="tx1"/>
           </a:solidFill>
@@ -3194,16 +3195,16 @@
           <a:cs typeface="+mn-cs"/>
         </a:defRPr>
       </a:lvl7pPr>
-      <a:lvl8pPr marL="3429000" indent="-228600" algn="l" defTabSz="914400" rtl="0" eaLnBrk="1" latinLnBrk="0" hangingPunct="1">
+      <a:lvl8pPr marL="3428812" indent="-228589" algn="l" defTabSz="914348" rtl="0" eaLnBrk="1" latinLnBrk="0" hangingPunct="1">
         <a:lnSpc>
           <a:spcPct val="90000"/>
         </a:lnSpc>
         <a:spcBef>
-          <a:spcPts val="500"/>
+          <a:spcPts val="501"/>
         </a:spcBef>
         <a:buFont typeface="Arial" panose="020B0604020202020204" pitchFamily="34" charset="0"/>
         <a:buChar char="•"/>
-        <a:defRPr sz="1800" kern="1200">
+        <a:defRPr sz="1801" kern="1200">
           <a:solidFill>
             <a:schemeClr val="tx1"/>
           </a:solidFill>
@@ -3212,16 +3213,16 @@
           <a:cs typeface="+mn-cs"/>
         </a:defRPr>
       </a:lvl8pPr>
-      <a:lvl9pPr marL="3886200" indent="-228600" algn="l" defTabSz="914400" rtl="0" eaLnBrk="1" latinLnBrk="0" hangingPunct="1">
+      <a:lvl9pPr marL="3885986" indent="-228589" algn="l" defTabSz="914348" rtl="0" eaLnBrk="1" latinLnBrk="0" hangingPunct="1">
         <a:lnSpc>
           <a:spcPct val="90000"/>
         </a:lnSpc>
         <a:spcBef>
-          <a:spcPts val="500"/>
+          <a:spcPts val="501"/>
         </a:spcBef>
         <a:buFont typeface="Arial" panose="020B0604020202020204" pitchFamily="34" charset="0"/>
         <a:buChar char="•"/>
-        <a:defRPr sz="1800" kern="1200">
+        <a:defRPr sz="1801" kern="1200">
           <a:solidFill>
             <a:schemeClr val="tx1"/>
           </a:solidFill>
@@ -3235,8 +3236,8 @@
       <a:defPPr>
         <a:defRPr lang="en-US"/>
       </a:defPPr>
-      <a:lvl1pPr marL="0" algn="l" defTabSz="914400" rtl="0" eaLnBrk="1" latinLnBrk="0" hangingPunct="1">
-        <a:defRPr sz="1800" kern="1200">
+      <a:lvl1pPr marL="0" algn="l" defTabSz="914348" rtl="0" eaLnBrk="1" latinLnBrk="0" hangingPunct="1">
+        <a:defRPr sz="1801" kern="1200">
           <a:solidFill>
             <a:schemeClr val="tx1"/>
           </a:solidFill>
@@ -3245,8 +3246,8 @@
           <a:cs typeface="+mn-cs"/>
         </a:defRPr>
       </a:lvl1pPr>
-      <a:lvl2pPr marL="457200" algn="l" defTabSz="914400" rtl="0" eaLnBrk="1" latinLnBrk="0" hangingPunct="1">
-        <a:defRPr sz="1800" kern="1200">
+      <a:lvl2pPr marL="457174" algn="l" defTabSz="914348" rtl="0" eaLnBrk="1" latinLnBrk="0" hangingPunct="1">
+        <a:defRPr sz="1801" kern="1200">
           <a:solidFill>
             <a:schemeClr val="tx1"/>
           </a:solidFill>
@@ -3255,8 +3256,8 @@
           <a:cs typeface="+mn-cs"/>
         </a:defRPr>
       </a:lvl2pPr>
-      <a:lvl3pPr marL="914400" algn="l" defTabSz="914400" rtl="0" eaLnBrk="1" latinLnBrk="0" hangingPunct="1">
-        <a:defRPr sz="1800" kern="1200">
+      <a:lvl3pPr marL="914348" algn="l" defTabSz="914348" rtl="0" eaLnBrk="1" latinLnBrk="0" hangingPunct="1">
+        <a:defRPr sz="1801" kern="1200">
           <a:solidFill>
             <a:schemeClr val="tx1"/>
           </a:solidFill>
@@ -3265,8 +3266,8 @@
           <a:cs typeface="+mn-cs"/>
         </a:defRPr>
       </a:lvl3pPr>
-      <a:lvl4pPr marL="1371600" algn="l" defTabSz="914400" rtl="0" eaLnBrk="1" latinLnBrk="0" hangingPunct="1">
-        <a:defRPr sz="1800" kern="1200">
+      <a:lvl4pPr marL="1371523" algn="l" defTabSz="914348" rtl="0" eaLnBrk="1" latinLnBrk="0" hangingPunct="1">
+        <a:defRPr sz="1801" kern="1200">
           <a:solidFill>
             <a:schemeClr val="tx1"/>
           </a:solidFill>
@@ -3275,8 +3276,8 @@
           <a:cs typeface="+mn-cs"/>
         </a:defRPr>
       </a:lvl4pPr>
-      <a:lvl5pPr marL="1828800" algn="l" defTabSz="914400" rtl="0" eaLnBrk="1" latinLnBrk="0" hangingPunct="1">
-        <a:defRPr sz="1800" kern="1200">
+      <a:lvl5pPr marL="1828700" algn="l" defTabSz="914348" rtl="0" eaLnBrk="1" latinLnBrk="0" hangingPunct="1">
+        <a:defRPr sz="1801" kern="1200">
           <a:solidFill>
             <a:schemeClr val="tx1"/>
           </a:solidFill>
@@ -3285,8 +3286,8 @@
           <a:cs typeface="+mn-cs"/>
         </a:defRPr>
       </a:lvl5pPr>
-      <a:lvl6pPr marL="2286000" algn="l" defTabSz="914400" rtl="0" eaLnBrk="1" latinLnBrk="0" hangingPunct="1">
-        <a:defRPr sz="1800" kern="1200">
+      <a:lvl6pPr marL="2285875" algn="l" defTabSz="914348" rtl="0" eaLnBrk="1" latinLnBrk="0" hangingPunct="1">
+        <a:defRPr sz="1801" kern="1200">
           <a:solidFill>
             <a:schemeClr val="tx1"/>
           </a:solidFill>
@@ -3295,8 +3296,8 @@
           <a:cs typeface="+mn-cs"/>
         </a:defRPr>
       </a:lvl6pPr>
-      <a:lvl7pPr marL="2743200" algn="l" defTabSz="914400" rtl="0" eaLnBrk="1" latinLnBrk="0" hangingPunct="1">
-        <a:defRPr sz="1800" kern="1200">
+      <a:lvl7pPr marL="2743049" algn="l" defTabSz="914348" rtl="0" eaLnBrk="1" latinLnBrk="0" hangingPunct="1">
+        <a:defRPr sz="1801" kern="1200">
           <a:solidFill>
             <a:schemeClr val="tx1"/>
           </a:solidFill>
@@ -3305,8 +3306,8 @@
           <a:cs typeface="+mn-cs"/>
         </a:defRPr>
       </a:lvl7pPr>
-      <a:lvl8pPr marL="3200400" algn="l" defTabSz="914400" rtl="0" eaLnBrk="1" latinLnBrk="0" hangingPunct="1">
-        <a:defRPr sz="1800" kern="1200">
+      <a:lvl8pPr marL="3200223" algn="l" defTabSz="914348" rtl="0" eaLnBrk="1" latinLnBrk="0" hangingPunct="1">
+        <a:defRPr sz="1801" kern="1200">
           <a:solidFill>
             <a:schemeClr val="tx1"/>
           </a:solidFill>
@@ -3315,8 +3316,8 @@
           <a:cs typeface="+mn-cs"/>
         </a:defRPr>
       </a:lvl8pPr>
-      <a:lvl9pPr marL="3657600" algn="l" defTabSz="914400" rtl="0" eaLnBrk="1" latinLnBrk="0" hangingPunct="1">
-        <a:defRPr sz="1800" kern="1200">
+      <a:lvl9pPr marL="3657397" algn="l" defTabSz="914348" rtl="0" eaLnBrk="1" latinLnBrk="0" hangingPunct="1">
+        <a:defRPr sz="1801" kern="1200">
           <a:solidFill>
             <a:schemeClr val="tx1"/>
           </a:solidFill>
@@ -3361,8 +3362,8 @@
         </p:nvGrpSpPr>
         <p:grpSpPr>
           <a:xfrm rot="16200000">
-            <a:off x="1879134" y="-1233180"/>
-            <a:ext cx="1282116" cy="4404222"/>
+            <a:off x="1879137" y="-1233180"/>
+            <a:ext cx="1282116" cy="4404223"/>
             <a:chOff x="3590488" y="1317073"/>
             <a:chExt cx="1282116" cy="4404222"/>
           </a:xfrm>
@@ -3443,7 +3444,7 @@
               <a:lstStyle/>
               <a:p>
                 <a:pPr algn="ctr"/>
-                <a:endParaRPr lang="en-CA"/>
+                <a:endParaRPr lang="en-CA" sz="681"/>
               </a:p>
             </p:txBody>
           </p:sp>
@@ -3497,7 +3498,7 @@
               <a:lstStyle/>
               <a:p>
                 <a:pPr algn="ctr"/>
-                <a:endParaRPr lang="en-CA"/>
+                <a:endParaRPr lang="en-CA" sz="681"/>
               </a:p>
             </p:txBody>
           </p:sp>
@@ -3572,7 +3573,7 @@
               <a:lstStyle/>
               <a:p>
                 <a:pPr algn="ctr"/>
-                <a:endParaRPr lang="en-CA"/>
+                <a:endParaRPr lang="en-CA" sz="681"/>
               </a:p>
             </p:txBody>
           </p:sp>
@@ -3624,7 +3625,7 @@
               <a:lstStyle/>
               <a:p>
                 <a:pPr algn="ctr"/>
-                <a:endParaRPr lang="en-CA"/>
+                <a:endParaRPr lang="en-CA" sz="681"/>
               </a:p>
             </p:txBody>
           </p:sp>
@@ -3644,8 +3645,8 @@
         </p:nvGrpSpPr>
         <p:grpSpPr>
           <a:xfrm>
-            <a:off x="6853807" y="1609989"/>
-            <a:ext cx="436225" cy="924883"/>
+            <a:off x="6853809" y="1609988"/>
+            <a:ext cx="436226" cy="924885"/>
             <a:chOff x="6853807" y="1609989"/>
             <a:chExt cx="436225" cy="924883"/>
           </a:xfrm>
@@ -3700,7 +3701,7 @@
             <a:lstStyle/>
             <a:p>
               <a:pPr algn="ctr"/>
-              <a:endParaRPr lang="en-CA"/>
+              <a:endParaRPr lang="en-CA" sz="681"/>
             </a:p>
           </p:txBody>
         </p:sp>
@@ -3951,8 +3952,8 @@
         </p:nvGrpSpPr>
         <p:grpSpPr>
           <a:xfrm>
-            <a:off x="2325150" y="3951215"/>
-            <a:ext cx="436225" cy="933973"/>
+            <a:off x="2325152" y="3951216"/>
+            <a:ext cx="436226" cy="933973"/>
             <a:chOff x="2325150" y="3951215"/>
             <a:chExt cx="436225" cy="933973"/>
           </a:xfrm>
@@ -4027,7 +4028,7 @@
               <a:lstStyle/>
               <a:p>
                 <a:pPr algn="ctr"/>
-                <a:endParaRPr lang="en-CA"/>
+                <a:endParaRPr lang="en-CA" sz="681"/>
               </a:p>
             </p:txBody>
           </p:sp>
@@ -4313,7 +4314,7 @@
             <a:lstStyle/>
             <a:p>
               <a:pPr algn="ctr"/>
-              <a:endParaRPr lang="en-CA"/>
+              <a:endParaRPr lang="en-CA" sz="681"/>
             </a:p>
           </p:txBody>
         </p:sp>
@@ -4365,7 +4366,7 @@
             <a:lstStyle/>
             <a:p>
               <a:pPr algn="ctr"/>
-              <a:endParaRPr lang="en-CA"/>
+              <a:endParaRPr lang="en-CA" sz="681"/>
             </a:p>
           </p:txBody>
         </p:sp>
@@ -4419,7 +4420,7 @@
             <a:lstStyle/>
             <a:p>
               <a:pPr algn="ctr"/>
-              <a:endParaRPr lang="en-CA"/>
+              <a:endParaRPr lang="en-CA" sz="681"/>
             </a:p>
           </p:txBody>
         </p:sp>
@@ -4473,7 +4474,7 @@
             <a:lstStyle/>
             <a:p>
               <a:pPr algn="ctr"/>
-              <a:endParaRPr lang="en-CA"/>
+              <a:endParaRPr lang="en-CA" sz="681"/>
             </a:p>
           </p:txBody>
         </p:sp>
@@ -4526,6 +4527,697 @@
     <p:extLst>
       <p:ext uri="{BB962C8B-B14F-4D97-AF65-F5344CB8AC3E}">
         <p14:creationId xmlns:p14="http://schemas.microsoft.com/office/powerpoint/2010/main" val="3038858384"/>
+      </p:ext>
+    </p:extLst>
+  </p:cSld>
+  <p:clrMapOvr>
+    <a:masterClrMapping/>
+  </p:clrMapOvr>
+</p:sld>
+</file>
+
+<file path=ppt/slides/slide2.xml><?xml version="1.0" encoding="utf-8"?>
+<p:sld xmlns:a="http://schemas.openxmlformats.org/drawingml/2006/main" xmlns:r="http://schemas.openxmlformats.org/officeDocument/2006/relationships" xmlns:p="http://schemas.openxmlformats.org/presentationml/2006/main">
+  <p:cSld>
+    <p:spTree>
+      <p:nvGrpSpPr>
+        <p:cNvPr id="1" name=""/>
+        <p:cNvGrpSpPr/>
+        <p:nvPr/>
+      </p:nvGrpSpPr>
+      <p:grpSpPr>
+        <a:xfrm>
+          <a:off x="0" y="0"/>
+          <a:ext cx="0" cy="0"/>
+          <a:chOff x="0" y="0"/>
+          <a:chExt cx="0" cy="0"/>
+        </a:xfrm>
+      </p:grpSpPr>
+      <p:grpSp>
+        <p:nvGrpSpPr>
+          <p:cNvPr id="20" name="Group 19">
+            <a:extLst>
+              <a:ext uri="{FF2B5EF4-FFF2-40B4-BE49-F238E27FC236}">
+                <a16:creationId xmlns:a16="http://schemas.microsoft.com/office/drawing/2014/main" id="{BE3E18E3-6E98-4DF1-BDF1-9DC664C1E926}"/>
+              </a:ext>
+            </a:extLst>
+          </p:cNvPr>
+          <p:cNvGrpSpPr/>
+          <p:nvPr/>
+        </p:nvGrpSpPr>
+        <p:grpSpPr>
+          <a:xfrm>
+            <a:off x="1996580" y="964734"/>
+            <a:ext cx="2550253" cy="2550253"/>
+            <a:chOff x="1996580" y="964734"/>
+            <a:chExt cx="2550253" cy="2550253"/>
+          </a:xfrm>
+        </p:grpSpPr>
+        <p:sp>
+          <p:nvSpPr>
+            <p:cNvPr id="4" name="Rectangle 3">
+              <a:extLst>
+                <a:ext uri="{FF2B5EF4-FFF2-40B4-BE49-F238E27FC236}">
+                  <a16:creationId xmlns:a16="http://schemas.microsoft.com/office/drawing/2014/main" id="{7FEB7C53-F28E-4BD0-8E1C-06C4C872081F}"/>
+                </a:ext>
+              </a:extLst>
+            </p:cNvPr>
+            <p:cNvSpPr/>
+            <p:nvPr/>
+          </p:nvSpPr>
+          <p:spPr>
+            <a:xfrm>
+              <a:off x="1996580" y="964734"/>
+              <a:ext cx="2550253" cy="2550253"/>
+            </a:xfrm>
+            <a:prstGeom prst="rect">
+              <a:avLst/>
+            </a:prstGeom>
+            <a:noFill/>
+            <a:ln>
+              <a:noFill/>
+            </a:ln>
+          </p:spPr>
+          <p:style>
+            <a:lnRef idx="2">
+              <a:schemeClr val="accent1">
+                <a:shade val="50000"/>
+              </a:schemeClr>
+            </a:lnRef>
+            <a:fillRef idx="1">
+              <a:schemeClr val="accent1"/>
+            </a:fillRef>
+            <a:effectRef idx="0">
+              <a:schemeClr val="accent1"/>
+            </a:effectRef>
+            <a:fontRef idx="minor">
+              <a:schemeClr val="lt1"/>
+            </a:fontRef>
+          </p:style>
+          <p:txBody>
+            <a:bodyPr rtlCol="0" anchor="ctr"/>
+            <a:lstStyle/>
+            <a:p>
+              <a:pPr algn="ctr"/>
+              <a:endParaRPr lang="en-CA"/>
+            </a:p>
+          </p:txBody>
+        </p:sp>
+        <p:grpSp>
+          <p:nvGrpSpPr>
+            <p:cNvPr id="5" name="Group 4">
+              <a:extLst>
+                <a:ext uri="{FF2B5EF4-FFF2-40B4-BE49-F238E27FC236}">
+                  <a16:creationId xmlns:a16="http://schemas.microsoft.com/office/drawing/2014/main" id="{67F072BE-AB0F-48C7-81F7-06FD1139EEE0}"/>
+                </a:ext>
+              </a:extLst>
+            </p:cNvPr>
+            <p:cNvGrpSpPr/>
+            <p:nvPr/>
+          </p:nvGrpSpPr>
+          <p:grpSpPr>
+            <a:xfrm>
+              <a:off x="2314942" y="1790184"/>
+              <a:ext cx="746617" cy="1582975"/>
+              <a:chOff x="6853807" y="1609989"/>
+              <a:chExt cx="436225" cy="924883"/>
+            </a:xfrm>
+          </p:grpSpPr>
+          <p:sp>
+            <p:nvSpPr>
+              <p:cNvPr id="6" name="Oval 5">
+                <a:extLst>
+                  <a:ext uri="{FF2B5EF4-FFF2-40B4-BE49-F238E27FC236}">
+                    <a16:creationId xmlns:a16="http://schemas.microsoft.com/office/drawing/2014/main" id="{7289C6F8-E16A-4B58-9484-D3981130EE66}"/>
+                  </a:ext>
+                </a:extLst>
+              </p:cNvPr>
+              <p:cNvSpPr/>
+              <p:nvPr/>
+            </p:nvSpPr>
+            <p:spPr>
+              <a:xfrm>
+                <a:off x="6904139" y="1609989"/>
+                <a:ext cx="343949" cy="343949"/>
+              </a:xfrm>
+              <a:prstGeom prst="ellipse">
+                <a:avLst/>
+              </a:prstGeom>
+              <a:solidFill>
+                <a:schemeClr val="tx1"/>
+              </a:solidFill>
+              <a:ln>
+                <a:solidFill>
+                  <a:schemeClr val="tx1"/>
+                </a:solidFill>
+              </a:ln>
+            </p:spPr>
+            <p:style>
+              <a:lnRef idx="2">
+                <a:schemeClr val="accent1">
+                  <a:shade val="50000"/>
+                </a:schemeClr>
+              </a:lnRef>
+              <a:fillRef idx="1">
+                <a:schemeClr val="accent1"/>
+              </a:fillRef>
+              <a:effectRef idx="0">
+                <a:schemeClr val="accent1"/>
+              </a:effectRef>
+              <a:fontRef idx="minor">
+                <a:schemeClr val="lt1"/>
+              </a:fontRef>
+            </p:style>
+            <p:txBody>
+              <a:bodyPr rtlCol="0" anchor="ctr"/>
+              <a:lstStyle/>
+              <a:p>
+                <a:pPr algn="ctr"/>
+                <a:endParaRPr lang="en-CA" sz="681"/>
+              </a:p>
+            </p:txBody>
+          </p:sp>
+          <p:cxnSp>
+            <p:nvCxnSpPr>
+              <p:cNvPr id="7" name="Straight Connector 6">
+                <a:extLst>
+                  <a:ext uri="{FF2B5EF4-FFF2-40B4-BE49-F238E27FC236}">
+                    <a16:creationId xmlns:a16="http://schemas.microsoft.com/office/drawing/2014/main" id="{1F120609-A3FA-4E0F-9502-868250CF1267}"/>
+                  </a:ext>
+                </a:extLst>
+              </p:cNvPr>
+              <p:cNvCxnSpPr>
+                <a:stCxn id="6" idx="4"/>
+              </p:cNvCxnSpPr>
+              <p:nvPr/>
+            </p:nvCxnSpPr>
+            <p:spPr>
+              <a:xfrm flipH="1">
+                <a:off x="7071919" y="1953938"/>
+                <a:ext cx="4195" cy="361423"/>
+              </a:xfrm>
+              <a:prstGeom prst="line">
+                <a:avLst/>
+              </a:prstGeom>
+              <a:ln w="38100">
+                <a:solidFill>
+                  <a:schemeClr val="tx1"/>
+                </a:solidFill>
+              </a:ln>
+            </p:spPr>
+            <p:style>
+              <a:lnRef idx="1">
+                <a:schemeClr val="accent1"/>
+              </a:lnRef>
+              <a:fillRef idx="0">
+                <a:schemeClr val="accent1"/>
+              </a:fillRef>
+              <a:effectRef idx="0">
+                <a:schemeClr val="accent1"/>
+              </a:effectRef>
+              <a:fontRef idx="minor">
+                <a:schemeClr val="tx1"/>
+              </a:fontRef>
+            </p:style>
+          </p:cxnSp>
+          <p:cxnSp>
+            <p:nvCxnSpPr>
+              <p:cNvPr id="8" name="Straight Connector 7">
+                <a:extLst>
+                  <a:ext uri="{FF2B5EF4-FFF2-40B4-BE49-F238E27FC236}">
+                    <a16:creationId xmlns:a16="http://schemas.microsoft.com/office/drawing/2014/main" id="{448E840C-3881-454B-B6FC-28D4D0D090C5}"/>
+                  </a:ext>
+                </a:extLst>
+              </p:cNvPr>
+              <p:cNvCxnSpPr/>
+              <p:nvPr/>
+            </p:nvCxnSpPr>
+            <p:spPr>
+              <a:xfrm flipV="1">
+                <a:off x="7071919" y="1996580"/>
+                <a:ext cx="218113" cy="218113"/>
+              </a:xfrm>
+              <a:prstGeom prst="line">
+                <a:avLst/>
+              </a:prstGeom>
+              <a:ln w="38100">
+                <a:solidFill>
+                  <a:schemeClr val="tx1"/>
+                </a:solidFill>
+              </a:ln>
+            </p:spPr>
+            <p:style>
+              <a:lnRef idx="1">
+                <a:schemeClr val="accent1"/>
+              </a:lnRef>
+              <a:fillRef idx="0">
+                <a:schemeClr val="accent1"/>
+              </a:fillRef>
+              <a:effectRef idx="0">
+                <a:schemeClr val="accent1"/>
+              </a:effectRef>
+              <a:fontRef idx="minor">
+                <a:schemeClr val="tx1"/>
+              </a:fontRef>
+            </p:style>
+          </p:cxnSp>
+          <p:cxnSp>
+            <p:nvCxnSpPr>
+              <p:cNvPr id="9" name="Straight Connector 8">
+                <a:extLst>
+                  <a:ext uri="{FF2B5EF4-FFF2-40B4-BE49-F238E27FC236}">
+                    <a16:creationId xmlns:a16="http://schemas.microsoft.com/office/drawing/2014/main" id="{664EB684-C150-4BC1-BA51-15CE6A6FFF32}"/>
+                  </a:ext>
+                </a:extLst>
+              </p:cNvPr>
+              <p:cNvCxnSpPr>
+                <a:cxnSpLocks/>
+              </p:cNvCxnSpPr>
+              <p:nvPr/>
+            </p:nvCxnSpPr>
+            <p:spPr>
+              <a:xfrm flipH="1" flipV="1">
+                <a:off x="6853807" y="2005670"/>
+                <a:ext cx="218112" cy="209023"/>
+              </a:xfrm>
+              <a:prstGeom prst="line">
+                <a:avLst/>
+              </a:prstGeom>
+              <a:ln w="38100">
+                <a:solidFill>
+                  <a:schemeClr val="tx1"/>
+                </a:solidFill>
+              </a:ln>
+            </p:spPr>
+            <p:style>
+              <a:lnRef idx="1">
+                <a:schemeClr val="accent1"/>
+              </a:lnRef>
+              <a:fillRef idx="0">
+                <a:schemeClr val="accent1"/>
+              </a:fillRef>
+              <a:effectRef idx="0">
+                <a:schemeClr val="accent1"/>
+              </a:effectRef>
+              <a:fontRef idx="minor">
+                <a:schemeClr val="tx1"/>
+              </a:fontRef>
+            </p:style>
+          </p:cxnSp>
+          <p:grpSp>
+            <p:nvGrpSpPr>
+              <p:cNvPr id="10" name="Group 9">
+                <a:extLst>
+                  <a:ext uri="{FF2B5EF4-FFF2-40B4-BE49-F238E27FC236}">
+                    <a16:creationId xmlns:a16="http://schemas.microsoft.com/office/drawing/2014/main" id="{E650ADAC-1B42-4C2E-A836-2D217D21D346}"/>
+                  </a:ext>
+                </a:extLst>
+              </p:cNvPr>
+              <p:cNvGrpSpPr/>
+              <p:nvPr/>
+            </p:nvGrpSpPr>
+            <p:grpSpPr>
+              <a:xfrm rot="10800000">
+                <a:off x="6853807" y="2316759"/>
+                <a:ext cx="436225" cy="218113"/>
+                <a:chOff x="6962863" y="2659310"/>
+                <a:chExt cx="436225" cy="218113"/>
+              </a:xfrm>
+            </p:grpSpPr>
+            <p:cxnSp>
+              <p:nvCxnSpPr>
+                <p:cNvPr id="11" name="Straight Connector 10">
+                  <a:extLst>
+                    <a:ext uri="{FF2B5EF4-FFF2-40B4-BE49-F238E27FC236}">
+                      <a16:creationId xmlns:a16="http://schemas.microsoft.com/office/drawing/2014/main" id="{39A1A4B2-65E1-4B48-9EDF-25C278D7F7AD}"/>
+                    </a:ext>
+                  </a:extLst>
+                </p:cNvPr>
+                <p:cNvCxnSpPr/>
+                <p:nvPr/>
+              </p:nvCxnSpPr>
+              <p:spPr>
+                <a:xfrm flipV="1">
+                  <a:off x="7180975" y="2659310"/>
+                  <a:ext cx="218113" cy="218113"/>
+                </a:xfrm>
+                <a:prstGeom prst="line">
+                  <a:avLst/>
+                </a:prstGeom>
+                <a:ln w="38100">
+                  <a:solidFill>
+                    <a:schemeClr val="tx1"/>
+                  </a:solidFill>
+                </a:ln>
+              </p:spPr>
+              <p:style>
+                <a:lnRef idx="1">
+                  <a:schemeClr val="accent1"/>
+                </a:lnRef>
+                <a:fillRef idx="0">
+                  <a:schemeClr val="accent1"/>
+                </a:fillRef>
+                <a:effectRef idx="0">
+                  <a:schemeClr val="accent1"/>
+                </a:effectRef>
+                <a:fontRef idx="minor">
+                  <a:schemeClr val="tx1"/>
+                </a:fontRef>
+              </p:style>
+            </p:cxnSp>
+            <p:cxnSp>
+              <p:nvCxnSpPr>
+                <p:cNvPr id="12" name="Straight Connector 11">
+                  <a:extLst>
+                    <a:ext uri="{FF2B5EF4-FFF2-40B4-BE49-F238E27FC236}">
+                      <a16:creationId xmlns:a16="http://schemas.microsoft.com/office/drawing/2014/main" id="{E882554C-EE44-4884-96F4-8281AD90CF8B}"/>
+                    </a:ext>
+                  </a:extLst>
+                </p:cNvPr>
+                <p:cNvCxnSpPr>
+                  <a:cxnSpLocks/>
+                </p:cNvCxnSpPr>
+                <p:nvPr/>
+              </p:nvCxnSpPr>
+              <p:spPr>
+                <a:xfrm flipH="1" flipV="1">
+                  <a:off x="6962863" y="2668400"/>
+                  <a:ext cx="218112" cy="209023"/>
+                </a:xfrm>
+                <a:prstGeom prst="line">
+                  <a:avLst/>
+                </a:prstGeom>
+                <a:ln w="38100">
+                  <a:solidFill>
+                    <a:schemeClr val="tx1"/>
+                  </a:solidFill>
+                </a:ln>
+              </p:spPr>
+              <p:style>
+                <a:lnRef idx="1">
+                  <a:schemeClr val="accent1"/>
+                </a:lnRef>
+                <a:fillRef idx="0">
+                  <a:schemeClr val="accent1"/>
+                </a:fillRef>
+                <a:effectRef idx="0">
+                  <a:schemeClr val="accent1"/>
+                </a:effectRef>
+                <a:fontRef idx="minor">
+                  <a:schemeClr val="tx1"/>
+                </a:fontRef>
+              </p:style>
+            </p:cxnSp>
+          </p:grpSp>
+        </p:grpSp>
+        <p:grpSp>
+          <p:nvGrpSpPr>
+            <p:cNvPr id="13" name="Group 12">
+              <a:extLst>
+                <a:ext uri="{FF2B5EF4-FFF2-40B4-BE49-F238E27FC236}">
+                  <a16:creationId xmlns:a16="http://schemas.microsoft.com/office/drawing/2014/main" id="{42C5D675-1534-4085-B15C-405B48B15B06}"/>
+                </a:ext>
+              </a:extLst>
+            </p:cNvPr>
+            <p:cNvGrpSpPr/>
+            <p:nvPr/>
+          </p:nvGrpSpPr>
+          <p:grpSpPr>
+            <a:xfrm rot="18006991">
+              <a:off x="3206148" y="750174"/>
+              <a:ext cx="569759" cy="1957191"/>
+              <a:chOff x="3590488" y="1317073"/>
+              <a:chExt cx="1282116" cy="4404222"/>
+            </a:xfrm>
+          </p:grpSpPr>
+          <p:grpSp>
+            <p:nvGrpSpPr>
+              <p:cNvPr id="14" name="Group 13">
+                <a:extLst>
+                  <a:ext uri="{FF2B5EF4-FFF2-40B4-BE49-F238E27FC236}">
+                    <a16:creationId xmlns:a16="http://schemas.microsoft.com/office/drawing/2014/main" id="{FC8B88D1-FF30-4525-9788-9468ADE0A34E}"/>
+                  </a:ext>
+                </a:extLst>
+              </p:cNvPr>
+              <p:cNvGrpSpPr/>
+              <p:nvPr/>
+            </p:nvGrpSpPr>
+            <p:grpSpPr>
+              <a:xfrm>
+                <a:off x="3590488" y="1589714"/>
+                <a:ext cx="1282116" cy="4131581"/>
+                <a:chOff x="3590488" y="1589714"/>
+                <a:chExt cx="1282116" cy="4131581"/>
+              </a:xfrm>
+            </p:grpSpPr>
+            <p:sp>
+              <p:nvSpPr>
+                <p:cNvPr id="18" name="Rectangle: Rounded Corners 17">
+                  <a:extLst>
+                    <a:ext uri="{FF2B5EF4-FFF2-40B4-BE49-F238E27FC236}">
+                      <a16:creationId xmlns:a16="http://schemas.microsoft.com/office/drawing/2014/main" id="{3349E187-A672-4FF7-854D-281E08224C2B}"/>
+                    </a:ext>
+                  </a:extLst>
+                </p:cNvPr>
+                <p:cNvSpPr/>
+                <p:nvPr/>
+              </p:nvSpPr>
+              <p:spPr>
+                <a:xfrm rot="5400000">
+                  <a:off x="2389462" y="3656203"/>
+                  <a:ext cx="3677178" cy="453005"/>
+                </a:xfrm>
+                <a:prstGeom prst="roundRect">
+                  <a:avLst>
+                    <a:gd name="adj" fmla="val 50000"/>
+                  </a:avLst>
+                </a:prstGeom>
+                <a:solidFill>
+                  <a:schemeClr val="bg1">
+                    <a:lumMod val="50000"/>
+                  </a:schemeClr>
+                </a:solidFill>
+                <a:ln>
+                  <a:solidFill>
+                    <a:schemeClr val="bg1">
+                      <a:lumMod val="50000"/>
+                    </a:schemeClr>
+                  </a:solidFill>
+                </a:ln>
+              </p:spPr>
+              <p:style>
+                <a:lnRef idx="2">
+                  <a:schemeClr val="accent1">
+                    <a:shade val="50000"/>
+                  </a:schemeClr>
+                </a:lnRef>
+                <a:fillRef idx="1">
+                  <a:schemeClr val="accent1"/>
+                </a:fillRef>
+                <a:effectRef idx="0">
+                  <a:schemeClr val="accent1"/>
+                </a:effectRef>
+                <a:fontRef idx="minor">
+                  <a:schemeClr val="lt1"/>
+                </a:fontRef>
+              </p:style>
+              <p:txBody>
+                <a:bodyPr rtlCol="0" anchor="ctr"/>
+                <a:lstStyle/>
+                <a:p>
+                  <a:pPr algn="ctr"/>
+                  <a:endParaRPr lang="en-CA" sz="681"/>
+                </a:p>
+              </p:txBody>
+            </p:sp>
+            <p:sp>
+              <p:nvSpPr>
+                <p:cNvPr id="19" name="Oval 18">
+                  <a:extLst>
+                    <a:ext uri="{FF2B5EF4-FFF2-40B4-BE49-F238E27FC236}">
+                      <a16:creationId xmlns:a16="http://schemas.microsoft.com/office/drawing/2014/main" id="{82A1972A-36D0-459F-A9CB-810D201F1656}"/>
+                    </a:ext>
+                  </a:extLst>
+                </p:cNvPr>
+                <p:cNvSpPr/>
+                <p:nvPr/>
+              </p:nvSpPr>
+              <p:spPr>
+                <a:xfrm>
+                  <a:off x="3590488" y="1589714"/>
+                  <a:ext cx="1282116" cy="1282116"/>
+                </a:xfrm>
+                <a:prstGeom prst="ellipse">
+                  <a:avLst/>
+                </a:prstGeom>
+                <a:solidFill>
+                  <a:schemeClr val="bg1">
+                    <a:lumMod val="50000"/>
+                  </a:schemeClr>
+                </a:solidFill>
+                <a:ln>
+                  <a:noFill/>
+                </a:ln>
+              </p:spPr>
+              <p:style>
+                <a:lnRef idx="2">
+                  <a:schemeClr val="accent1">
+                    <a:shade val="50000"/>
+                  </a:schemeClr>
+                </a:lnRef>
+                <a:fillRef idx="1">
+                  <a:schemeClr val="accent1"/>
+                </a:fillRef>
+                <a:effectRef idx="0">
+                  <a:schemeClr val="accent1"/>
+                </a:effectRef>
+                <a:fontRef idx="minor">
+                  <a:schemeClr val="lt1"/>
+                </a:fontRef>
+              </p:style>
+              <p:txBody>
+                <a:bodyPr rtlCol="0" anchor="ctr"/>
+                <a:lstStyle/>
+                <a:p>
+                  <a:pPr algn="ctr"/>
+                  <a:endParaRPr lang="en-CA" sz="681"/>
+                </a:p>
+              </p:txBody>
+            </p:sp>
+          </p:grpSp>
+          <p:grpSp>
+            <p:nvGrpSpPr>
+              <p:cNvPr id="15" name="Group 14">
+                <a:extLst>
+                  <a:ext uri="{FF2B5EF4-FFF2-40B4-BE49-F238E27FC236}">
+                    <a16:creationId xmlns:a16="http://schemas.microsoft.com/office/drawing/2014/main" id="{87E1884E-30F8-4AA4-BF43-560E96650E88}"/>
+                  </a:ext>
+                </a:extLst>
+              </p:cNvPr>
+              <p:cNvGrpSpPr/>
+              <p:nvPr/>
+            </p:nvGrpSpPr>
+            <p:grpSpPr>
+              <a:xfrm>
+                <a:off x="4001548" y="1317073"/>
+                <a:ext cx="453006" cy="1220941"/>
+                <a:chOff x="4001548" y="1266739"/>
+                <a:chExt cx="453006" cy="1220941"/>
+              </a:xfrm>
+            </p:grpSpPr>
+            <p:sp>
+              <p:nvSpPr>
+                <p:cNvPr id="16" name="Rectangle 15">
+                  <a:extLst>
+                    <a:ext uri="{FF2B5EF4-FFF2-40B4-BE49-F238E27FC236}">
+                      <a16:creationId xmlns:a16="http://schemas.microsoft.com/office/drawing/2014/main" id="{63550A24-FD21-4310-AC22-CEEE271A99C1}"/>
+                    </a:ext>
+                  </a:extLst>
+                </p:cNvPr>
+                <p:cNvSpPr/>
+                <p:nvPr/>
+              </p:nvSpPr>
+              <p:spPr>
+                <a:xfrm>
+                  <a:off x="4001548" y="1266739"/>
+                  <a:ext cx="453006" cy="973122"/>
+                </a:xfrm>
+                <a:prstGeom prst="rect">
+                  <a:avLst/>
+                </a:prstGeom>
+                <a:solidFill>
+                  <a:srgbClr val="FFFFFF"/>
+                </a:solidFill>
+                <a:ln>
+                  <a:solidFill>
+                    <a:schemeClr val="bg1"/>
+                  </a:solidFill>
+                </a:ln>
+              </p:spPr>
+              <p:style>
+                <a:lnRef idx="2">
+                  <a:schemeClr val="accent1">
+                    <a:shade val="50000"/>
+                  </a:schemeClr>
+                </a:lnRef>
+                <a:fillRef idx="1">
+                  <a:schemeClr val="accent1"/>
+                </a:fillRef>
+                <a:effectRef idx="0">
+                  <a:schemeClr val="accent1"/>
+                </a:effectRef>
+                <a:fontRef idx="minor">
+                  <a:schemeClr val="lt1"/>
+                </a:fontRef>
+              </p:style>
+              <p:txBody>
+                <a:bodyPr rtlCol="0" anchor="ctr"/>
+                <a:lstStyle/>
+                <a:p>
+                  <a:pPr algn="ctr"/>
+                  <a:endParaRPr lang="en-CA" sz="681"/>
+                </a:p>
+              </p:txBody>
+            </p:sp>
+            <p:sp>
+              <p:nvSpPr>
+                <p:cNvPr id="17" name="Isosceles Triangle 16">
+                  <a:extLst>
+                    <a:ext uri="{FF2B5EF4-FFF2-40B4-BE49-F238E27FC236}">
+                      <a16:creationId xmlns:a16="http://schemas.microsoft.com/office/drawing/2014/main" id="{C0C55199-EC6B-4E72-BC62-4D585771CE5C}"/>
+                    </a:ext>
+                  </a:extLst>
+                </p:cNvPr>
+                <p:cNvSpPr/>
+                <p:nvPr/>
+              </p:nvSpPr>
+              <p:spPr>
+                <a:xfrm flipV="1">
+                  <a:off x="4001548" y="2245099"/>
+                  <a:ext cx="453006" cy="242581"/>
+                </a:xfrm>
+                <a:prstGeom prst="triangle">
+                  <a:avLst/>
+                </a:prstGeom>
+                <a:solidFill>
+                  <a:srgbClr val="FFFFFF"/>
+                </a:solidFill>
+                <a:ln>
+                  <a:noFill/>
+                </a:ln>
+              </p:spPr>
+              <p:style>
+                <a:lnRef idx="2">
+                  <a:schemeClr val="accent1">
+                    <a:shade val="50000"/>
+                  </a:schemeClr>
+                </a:lnRef>
+                <a:fillRef idx="1">
+                  <a:schemeClr val="accent1"/>
+                </a:fillRef>
+                <a:effectRef idx="0">
+                  <a:schemeClr val="accent1"/>
+                </a:effectRef>
+                <a:fontRef idx="minor">
+                  <a:schemeClr val="lt1"/>
+                </a:fontRef>
+              </p:style>
+              <p:txBody>
+                <a:bodyPr rtlCol="0" anchor="ctr"/>
+                <a:lstStyle/>
+                <a:p>
+                  <a:pPr algn="ctr"/>
+                  <a:endParaRPr lang="en-CA" sz="681"/>
+                </a:p>
+              </p:txBody>
+            </p:sp>
+          </p:grpSp>
+        </p:grpSp>
+      </p:grpSp>
+    </p:spTree>
+    <p:extLst>
+      <p:ext uri="{BB962C8B-B14F-4D97-AF65-F5344CB8AC3E}">
+        <p14:creationId xmlns:p14="http://schemas.microsoft.com/office/powerpoint/2010/main" val="2727500746"/>
       </p:ext>
     </p:extLst>
   </p:cSld>

</xml_diff>

<commit_message>
Added more photos for play store
</commit_message>
<xml_diff>
--- a/graphics.pptx
+++ b/graphics.pptx
@@ -6,7 +6,8 @@
   </p:sldMasterIdLst>
   <p:sldIdLst>
     <p:sldId id="256" r:id="rId2"/>
-    <p:sldId id="257" r:id="rId3"/>
+    <p:sldId id="258" r:id="rId3"/>
+    <p:sldId id="257" r:id="rId4"/>
   </p:sldIdLst>
   <p:sldSz cx="12192000" cy="6858000"/>
   <p:notesSz cx="6858000" cy="9144000"/>
@@ -4555,6 +4556,1703 @@
       </p:grpSpPr>
       <p:grpSp>
         <p:nvGrpSpPr>
+          <p:cNvPr id="47" name="Group 46">
+            <a:extLst>
+              <a:ext uri="{FF2B5EF4-FFF2-40B4-BE49-F238E27FC236}">
+                <a16:creationId xmlns:a16="http://schemas.microsoft.com/office/drawing/2014/main" id="{53EE604E-E8FA-4B14-9EB5-17929F9B318F}"/>
+              </a:ext>
+            </a:extLst>
+          </p:cNvPr>
+          <p:cNvGrpSpPr/>
+          <p:nvPr/>
+        </p:nvGrpSpPr>
+        <p:grpSpPr>
+          <a:xfrm>
+            <a:off x="1313476" y="1047750"/>
+            <a:ext cx="9753600" cy="4762500"/>
+            <a:chOff x="1313476" y="1047750"/>
+            <a:chExt cx="9753600" cy="4762500"/>
+          </a:xfrm>
+        </p:grpSpPr>
+        <p:sp>
+          <p:nvSpPr>
+            <p:cNvPr id="4" name="Rectangle 3">
+              <a:extLst>
+                <a:ext uri="{FF2B5EF4-FFF2-40B4-BE49-F238E27FC236}">
+                  <a16:creationId xmlns:a16="http://schemas.microsoft.com/office/drawing/2014/main" id="{44E1CA9B-C38B-4AA1-A426-775221B64EEF}"/>
+                </a:ext>
+              </a:extLst>
+            </p:cNvPr>
+            <p:cNvSpPr/>
+            <p:nvPr/>
+          </p:nvSpPr>
+          <p:spPr>
+            <a:xfrm>
+              <a:off x="1313476" y="1047750"/>
+              <a:ext cx="9753600" cy="4762500"/>
+            </a:xfrm>
+            <a:prstGeom prst="rect">
+              <a:avLst/>
+            </a:prstGeom>
+            <a:solidFill>
+              <a:srgbClr val="EDF7D2"/>
+            </a:solidFill>
+            <a:ln>
+              <a:solidFill>
+                <a:srgbClr val="EDF7D2"/>
+              </a:solidFill>
+            </a:ln>
+          </p:spPr>
+          <p:style>
+            <a:lnRef idx="2">
+              <a:schemeClr val="accent1">
+                <a:shade val="50000"/>
+              </a:schemeClr>
+            </a:lnRef>
+            <a:fillRef idx="1">
+              <a:schemeClr val="accent1"/>
+            </a:fillRef>
+            <a:effectRef idx="0">
+              <a:schemeClr val="accent1"/>
+            </a:effectRef>
+            <a:fontRef idx="minor">
+              <a:schemeClr val="lt1"/>
+            </a:fontRef>
+          </p:style>
+          <p:txBody>
+            <a:bodyPr rtlCol="0" anchor="ctr"/>
+            <a:lstStyle/>
+            <a:p>
+              <a:pPr algn="ctr"/>
+              <a:endParaRPr lang="en-CA"/>
+            </a:p>
+          </p:txBody>
+        </p:sp>
+        <p:grpSp>
+          <p:nvGrpSpPr>
+            <p:cNvPr id="5" name="Group 4">
+              <a:extLst>
+                <a:ext uri="{FF2B5EF4-FFF2-40B4-BE49-F238E27FC236}">
+                  <a16:creationId xmlns:a16="http://schemas.microsoft.com/office/drawing/2014/main" id="{29F0E705-1456-44C5-AAD9-7654AA95C7E4}"/>
+                </a:ext>
+              </a:extLst>
+            </p:cNvPr>
+            <p:cNvGrpSpPr/>
+            <p:nvPr/>
+          </p:nvGrpSpPr>
+          <p:grpSpPr>
+            <a:xfrm>
+              <a:off x="4132576" y="3892892"/>
+              <a:ext cx="664876" cy="1423520"/>
+              <a:chOff x="2325150" y="3951215"/>
+              <a:chExt cx="436225" cy="933973"/>
+            </a:xfrm>
+          </p:grpSpPr>
+          <p:grpSp>
+            <p:nvGrpSpPr>
+              <p:cNvPr id="6" name="Group 5">
+                <a:extLst>
+                  <a:ext uri="{FF2B5EF4-FFF2-40B4-BE49-F238E27FC236}">
+                    <a16:creationId xmlns:a16="http://schemas.microsoft.com/office/drawing/2014/main" id="{C01EA196-8C33-4EEE-8793-FEDA49CD425B}"/>
+                  </a:ext>
+                </a:extLst>
+              </p:cNvPr>
+              <p:cNvGrpSpPr/>
+              <p:nvPr/>
+            </p:nvGrpSpPr>
+            <p:grpSpPr>
+              <a:xfrm>
+                <a:off x="2325150" y="3960305"/>
+                <a:ext cx="436225" cy="924883"/>
+                <a:chOff x="6853807" y="1609989"/>
+                <a:chExt cx="436225" cy="924883"/>
+              </a:xfrm>
+            </p:grpSpPr>
+            <p:sp>
+              <p:nvSpPr>
+                <p:cNvPr id="12" name="Oval 11">
+                  <a:extLst>
+                    <a:ext uri="{FF2B5EF4-FFF2-40B4-BE49-F238E27FC236}">
+                      <a16:creationId xmlns:a16="http://schemas.microsoft.com/office/drawing/2014/main" id="{66A7C55C-5F79-4892-8975-F5E1D90C8CE7}"/>
+                    </a:ext>
+                  </a:extLst>
+                </p:cNvPr>
+                <p:cNvSpPr/>
+                <p:nvPr/>
+              </p:nvSpPr>
+              <p:spPr>
+                <a:xfrm>
+                  <a:off x="6904139" y="1609989"/>
+                  <a:ext cx="343949" cy="343949"/>
+                </a:xfrm>
+                <a:prstGeom prst="ellipse">
+                  <a:avLst/>
+                </a:prstGeom>
+                <a:solidFill>
+                  <a:schemeClr val="tx1"/>
+                </a:solidFill>
+                <a:ln>
+                  <a:solidFill>
+                    <a:schemeClr val="tx1"/>
+                  </a:solidFill>
+                </a:ln>
+              </p:spPr>
+              <p:style>
+                <a:lnRef idx="2">
+                  <a:schemeClr val="accent1">
+                    <a:shade val="50000"/>
+                  </a:schemeClr>
+                </a:lnRef>
+                <a:fillRef idx="1">
+                  <a:schemeClr val="accent1"/>
+                </a:fillRef>
+                <a:effectRef idx="0">
+                  <a:schemeClr val="accent1"/>
+                </a:effectRef>
+                <a:fontRef idx="minor">
+                  <a:schemeClr val="lt1"/>
+                </a:fontRef>
+              </p:style>
+              <p:txBody>
+                <a:bodyPr rtlCol="0" anchor="ctr"/>
+                <a:lstStyle/>
+                <a:p>
+                  <a:pPr algn="ctr"/>
+                  <a:endParaRPr lang="en-CA" sz="681"/>
+                </a:p>
+              </p:txBody>
+            </p:sp>
+            <p:cxnSp>
+              <p:nvCxnSpPr>
+                <p:cNvPr id="13" name="Straight Connector 12">
+                  <a:extLst>
+                    <a:ext uri="{FF2B5EF4-FFF2-40B4-BE49-F238E27FC236}">
+                      <a16:creationId xmlns:a16="http://schemas.microsoft.com/office/drawing/2014/main" id="{9F564066-D67B-44EC-93A6-9ABA4F8A294D}"/>
+                    </a:ext>
+                  </a:extLst>
+                </p:cNvPr>
+                <p:cNvCxnSpPr>
+                  <a:stCxn id="12" idx="4"/>
+                </p:cNvCxnSpPr>
+                <p:nvPr/>
+              </p:nvCxnSpPr>
+              <p:spPr>
+                <a:xfrm flipH="1">
+                  <a:off x="7071919" y="1953938"/>
+                  <a:ext cx="4195" cy="361423"/>
+                </a:xfrm>
+                <a:prstGeom prst="line">
+                  <a:avLst/>
+                </a:prstGeom>
+                <a:ln w="38100">
+                  <a:solidFill>
+                    <a:schemeClr val="tx1"/>
+                  </a:solidFill>
+                </a:ln>
+              </p:spPr>
+              <p:style>
+                <a:lnRef idx="1">
+                  <a:schemeClr val="accent1"/>
+                </a:lnRef>
+                <a:fillRef idx="0">
+                  <a:schemeClr val="accent1"/>
+                </a:fillRef>
+                <a:effectRef idx="0">
+                  <a:schemeClr val="accent1"/>
+                </a:effectRef>
+                <a:fontRef idx="minor">
+                  <a:schemeClr val="tx1"/>
+                </a:fontRef>
+              </p:style>
+            </p:cxnSp>
+            <p:cxnSp>
+              <p:nvCxnSpPr>
+                <p:cNvPr id="14" name="Straight Connector 13">
+                  <a:extLst>
+                    <a:ext uri="{FF2B5EF4-FFF2-40B4-BE49-F238E27FC236}">
+                      <a16:creationId xmlns:a16="http://schemas.microsoft.com/office/drawing/2014/main" id="{DE4B4CD9-3513-4DBE-9567-82C8BBE022E6}"/>
+                    </a:ext>
+                  </a:extLst>
+                </p:cNvPr>
+                <p:cNvCxnSpPr/>
+                <p:nvPr/>
+              </p:nvCxnSpPr>
+              <p:spPr>
+                <a:xfrm flipV="1">
+                  <a:off x="7071919" y="1996580"/>
+                  <a:ext cx="218113" cy="218113"/>
+                </a:xfrm>
+                <a:prstGeom prst="line">
+                  <a:avLst/>
+                </a:prstGeom>
+                <a:ln w="38100">
+                  <a:solidFill>
+                    <a:schemeClr val="tx1"/>
+                  </a:solidFill>
+                </a:ln>
+              </p:spPr>
+              <p:style>
+                <a:lnRef idx="1">
+                  <a:schemeClr val="accent1"/>
+                </a:lnRef>
+                <a:fillRef idx="0">
+                  <a:schemeClr val="accent1"/>
+                </a:fillRef>
+                <a:effectRef idx="0">
+                  <a:schemeClr val="accent1"/>
+                </a:effectRef>
+                <a:fontRef idx="minor">
+                  <a:schemeClr val="tx1"/>
+                </a:fontRef>
+              </p:style>
+            </p:cxnSp>
+            <p:cxnSp>
+              <p:nvCxnSpPr>
+                <p:cNvPr id="15" name="Straight Connector 14">
+                  <a:extLst>
+                    <a:ext uri="{FF2B5EF4-FFF2-40B4-BE49-F238E27FC236}">
+                      <a16:creationId xmlns:a16="http://schemas.microsoft.com/office/drawing/2014/main" id="{FC78F8A8-C31F-4E75-844B-6E65A6309682}"/>
+                    </a:ext>
+                  </a:extLst>
+                </p:cNvPr>
+                <p:cNvCxnSpPr>
+                  <a:cxnSpLocks/>
+                </p:cNvCxnSpPr>
+                <p:nvPr/>
+              </p:nvCxnSpPr>
+              <p:spPr>
+                <a:xfrm flipH="1" flipV="1">
+                  <a:off x="6853807" y="2005670"/>
+                  <a:ext cx="218112" cy="209023"/>
+                </a:xfrm>
+                <a:prstGeom prst="line">
+                  <a:avLst/>
+                </a:prstGeom>
+                <a:ln w="38100">
+                  <a:solidFill>
+                    <a:schemeClr val="tx1"/>
+                  </a:solidFill>
+                </a:ln>
+              </p:spPr>
+              <p:style>
+                <a:lnRef idx="1">
+                  <a:schemeClr val="accent1"/>
+                </a:lnRef>
+                <a:fillRef idx="0">
+                  <a:schemeClr val="accent1"/>
+                </a:fillRef>
+                <a:effectRef idx="0">
+                  <a:schemeClr val="accent1"/>
+                </a:effectRef>
+                <a:fontRef idx="minor">
+                  <a:schemeClr val="tx1"/>
+                </a:fontRef>
+              </p:style>
+            </p:cxnSp>
+            <p:grpSp>
+              <p:nvGrpSpPr>
+                <p:cNvPr id="16" name="Group 15">
+                  <a:extLst>
+                    <a:ext uri="{FF2B5EF4-FFF2-40B4-BE49-F238E27FC236}">
+                      <a16:creationId xmlns:a16="http://schemas.microsoft.com/office/drawing/2014/main" id="{4780A2ED-9CDA-46C4-8C18-19B7FF1DD106}"/>
+                    </a:ext>
+                  </a:extLst>
+                </p:cNvPr>
+                <p:cNvGrpSpPr/>
+                <p:nvPr/>
+              </p:nvGrpSpPr>
+              <p:grpSpPr>
+                <a:xfrm rot="10800000">
+                  <a:off x="6853807" y="2316759"/>
+                  <a:ext cx="436225" cy="218113"/>
+                  <a:chOff x="6962863" y="2659310"/>
+                  <a:chExt cx="436225" cy="218113"/>
+                </a:xfrm>
+              </p:grpSpPr>
+              <p:cxnSp>
+                <p:nvCxnSpPr>
+                  <p:cNvPr id="17" name="Straight Connector 16">
+                    <a:extLst>
+                      <a:ext uri="{FF2B5EF4-FFF2-40B4-BE49-F238E27FC236}">
+                        <a16:creationId xmlns:a16="http://schemas.microsoft.com/office/drawing/2014/main" id="{B193AC71-C819-447E-A8DA-84C990FB2F25}"/>
+                      </a:ext>
+                    </a:extLst>
+                  </p:cNvPr>
+                  <p:cNvCxnSpPr/>
+                  <p:nvPr/>
+                </p:nvCxnSpPr>
+                <p:spPr>
+                  <a:xfrm flipV="1">
+                    <a:off x="7180975" y="2659310"/>
+                    <a:ext cx="218113" cy="218113"/>
+                  </a:xfrm>
+                  <a:prstGeom prst="line">
+                    <a:avLst/>
+                  </a:prstGeom>
+                  <a:ln w="38100">
+                    <a:solidFill>
+                      <a:schemeClr val="tx1"/>
+                    </a:solidFill>
+                  </a:ln>
+                </p:spPr>
+                <p:style>
+                  <a:lnRef idx="1">
+                    <a:schemeClr val="accent1"/>
+                  </a:lnRef>
+                  <a:fillRef idx="0">
+                    <a:schemeClr val="accent1"/>
+                  </a:fillRef>
+                  <a:effectRef idx="0">
+                    <a:schemeClr val="accent1"/>
+                  </a:effectRef>
+                  <a:fontRef idx="minor">
+                    <a:schemeClr val="tx1"/>
+                  </a:fontRef>
+                </p:style>
+              </p:cxnSp>
+              <p:cxnSp>
+                <p:nvCxnSpPr>
+                  <p:cNvPr id="18" name="Straight Connector 17">
+                    <a:extLst>
+                      <a:ext uri="{FF2B5EF4-FFF2-40B4-BE49-F238E27FC236}">
+                        <a16:creationId xmlns:a16="http://schemas.microsoft.com/office/drawing/2014/main" id="{B5A40C45-479D-4C69-B910-349C63E9FF2F}"/>
+                      </a:ext>
+                    </a:extLst>
+                  </p:cNvPr>
+                  <p:cNvCxnSpPr>
+                    <a:cxnSpLocks/>
+                  </p:cNvCxnSpPr>
+                  <p:nvPr/>
+                </p:nvCxnSpPr>
+                <p:spPr>
+                  <a:xfrm flipH="1" flipV="1">
+                    <a:off x="6962863" y="2668400"/>
+                    <a:ext cx="218112" cy="209023"/>
+                  </a:xfrm>
+                  <a:prstGeom prst="line">
+                    <a:avLst/>
+                  </a:prstGeom>
+                  <a:ln w="38100">
+                    <a:solidFill>
+                      <a:schemeClr val="tx1"/>
+                    </a:solidFill>
+                  </a:ln>
+                </p:spPr>
+                <p:style>
+                  <a:lnRef idx="1">
+                    <a:schemeClr val="accent1"/>
+                  </a:lnRef>
+                  <a:fillRef idx="0">
+                    <a:schemeClr val="accent1"/>
+                  </a:fillRef>
+                  <a:effectRef idx="0">
+                    <a:schemeClr val="accent1"/>
+                  </a:effectRef>
+                  <a:fontRef idx="minor">
+                    <a:schemeClr val="tx1"/>
+                  </a:fontRef>
+                </p:style>
+              </p:cxnSp>
+            </p:grpSp>
+          </p:grpSp>
+          <p:sp>
+            <p:nvSpPr>
+              <p:cNvPr id="7" name="Arc 6">
+                <a:extLst>
+                  <a:ext uri="{FF2B5EF4-FFF2-40B4-BE49-F238E27FC236}">
+                    <a16:creationId xmlns:a16="http://schemas.microsoft.com/office/drawing/2014/main" id="{4F225BAF-9BFD-4720-8784-BA5085EA7129}"/>
+                  </a:ext>
+                </a:extLst>
+              </p:cNvPr>
+              <p:cNvSpPr/>
+              <p:nvPr/>
+            </p:nvSpPr>
+            <p:spPr>
+              <a:xfrm flipV="1">
+                <a:off x="2375482" y="3951215"/>
+                <a:ext cx="343949" cy="156159"/>
+              </a:xfrm>
+              <a:prstGeom prst="arc">
+                <a:avLst>
+                  <a:gd name="adj1" fmla="val 11243172"/>
+                  <a:gd name="adj2" fmla="val 21239460"/>
+                </a:avLst>
+              </a:prstGeom>
+              <a:noFill/>
+              <a:ln w="38100">
+                <a:solidFill>
+                  <a:srgbClr val="7030A0"/>
+                </a:solidFill>
+              </a:ln>
+            </p:spPr>
+            <p:style>
+              <a:lnRef idx="1">
+                <a:schemeClr val="accent1"/>
+              </a:lnRef>
+              <a:fillRef idx="0">
+                <a:schemeClr val="accent1"/>
+              </a:fillRef>
+              <a:effectRef idx="0">
+                <a:schemeClr val="accent1"/>
+              </a:effectRef>
+              <a:fontRef idx="minor">
+                <a:schemeClr val="tx1"/>
+              </a:fontRef>
+            </p:style>
+            <p:txBody>
+              <a:bodyPr rtlCol="0" anchor="ctr"/>
+              <a:lstStyle/>
+              <a:p>
+                <a:pPr algn="ctr"/>
+                <a:endParaRPr lang="en-CA" sz="681"/>
+              </a:p>
+            </p:txBody>
+          </p:sp>
+          <p:sp>
+            <p:nvSpPr>
+              <p:cNvPr id="8" name="Rectangle 7">
+                <a:extLst>
+                  <a:ext uri="{FF2B5EF4-FFF2-40B4-BE49-F238E27FC236}">
+                    <a16:creationId xmlns:a16="http://schemas.microsoft.com/office/drawing/2014/main" id="{E32C8A99-9538-4BB4-985B-7DBE40085F16}"/>
+                  </a:ext>
+                </a:extLst>
+              </p:cNvPr>
+              <p:cNvSpPr/>
+              <p:nvPr/>
+            </p:nvSpPr>
+            <p:spPr>
+              <a:xfrm>
+                <a:off x="2434206" y="4406320"/>
+                <a:ext cx="218112" cy="383862"/>
+              </a:xfrm>
+              <a:prstGeom prst="rect">
+                <a:avLst/>
+              </a:prstGeom>
+              <a:solidFill>
+                <a:srgbClr val="7030A0"/>
+              </a:solidFill>
+              <a:ln>
+                <a:noFill/>
+              </a:ln>
+            </p:spPr>
+            <p:style>
+              <a:lnRef idx="2">
+                <a:schemeClr val="accent1">
+                  <a:shade val="50000"/>
+                </a:schemeClr>
+              </a:lnRef>
+              <a:fillRef idx="1">
+                <a:schemeClr val="accent1"/>
+              </a:fillRef>
+              <a:effectRef idx="0">
+                <a:schemeClr val="accent1"/>
+              </a:effectRef>
+              <a:fontRef idx="minor">
+                <a:schemeClr val="lt1"/>
+              </a:fontRef>
+            </p:style>
+            <p:txBody>
+              <a:bodyPr rtlCol="0" anchor="ctr"/>
+              <a:lstStyle/>
+              <a:p>
+                <a:pPr algn="ctr"/>
+                <a:endParaRPr lang="en-CA" sz="681"/>
+              </a:p>
+            </p:txBody>
+          </p:sp>
+          <p:sp>
+            <p:nvSpPr>
+              <p:cNvPr id="9" name="Rectangle 8">
+                <a:extLst>
+                  <a:ext uri="{FF2B5EF4-FFF2-40B4-BE49-F238E27FC236}">
+                    <a16:creationId xmlns:a16="http://schemas.microsoft.com/office/drawing/2014/main" id="{63AAA9E9-7169-45C7-A46D-2B7C1D3EB86F}"/>
+                  </a:ext>
+                </a:extLst>
+              </p:cNvPr>
+              <p:cNvSpPr/>
+              <p:nvPr/>
+            </p:nvSpPr>
+            <p:spPr>
+              <a:xfrm>
+                <a:off x="2651168" y="4387903"/>
+                <a:ext cx="55679" cy="88847"/>
+              </a:xfrm>
+              <a:prstGeom prst="rect">
+                <a:avLst/>
+              </a:prstGeom>
+              <a:solidFill>
+                <a:srgbClr val="7030A0"/>
+              </a:solidFill>
+              <a:ln>
+                <a:solidFill>
+                  <a:srgbClr val="7030A0"/>
+                </a:solidFill>
+              </a:ln>
+            </p:spPr>
+            <p:style>
+              <a:lnRef idx="2">
+                <a:schemeClr val="accent1">
+                  <a:shade val="50000"/>
+                </a:schemeClr>
+              </a:lnRef>
+              <a:fillRef idx="1">
+                <a:schemeClr val="accent1"/>
+              </a:fillRef>
+              <a:effectRef idx="0">
+                <a:schemeClr val="accent1"/>
+              </a:effectRef>
+              <a:fontRef idx="minor">
+                <a:schemeClr val="lt1"/>
+              </a:fontRef>
+            </p:style>
+            <p:txBody>
+              <a:bodyPr rtlCol="0" anchor="ctr"/>
+              <a:lstStyle/>
+              <a:p>
+                <a:pPr algn="ctr"/>
+                <a:endParaRPr lang="en-CA" sz="681"/>
+              </a:p>
+            </p:txBody>
+          </p:sp>
+          <p:sp>
+            <p:nvSpPr>
+              <p:cNvPr id="10" name="Rectangle 9">
+                <a:extLst>
+                  <a:ext uri="{FF2B5EF4-FFF2-40B4-BE49-F238E27FC236}">
+                    <a16:creationId xmlns:a16="http://schemas.microsoft.com/office/drawing/2014/main" id="{D53DD879-EEB6-454D-ABC1-934A78DAC1F3}"/>
+                  </a:ext>
+                </a:extLst>
+              </p:cNvPr>
+              <p:cNvSpPr/>
+              <p:nvPr/>
+            </p:nvSpPr>
+            <p:spPr>
+              <a:xfrm>
+                <a:off x="2379677" y="4387903"/>
+                <a:ext cx="55679" cy="88847"/>
+              </a:xfrm>
+              <a:prstGeom prst="rect">
+                <a:avLst/>
+              </a:prstGeom>
+              <a:solidFill>
+                <a:srgbClr val="7030A0"/>
+              </a:solidFill>
+              <a:ln>
+                <a:solidFill>
+                  <a:srgbClr val="7030A0"/>
+                </a:solidFill>
+              </a:ln>
+            </p:spPr>
+            <p:style>
+              <a:lnRef idx="2">
+                <a:schemeClr val="accent1">
+                  <a:shade val="50000"/>
+                </a:schemeClr>
+              </a:lnRef>
+              <a:fillRef idx="1">
+                <a:schemeClr val="accent1"/>
+              </a:fillRef>
+              <a:effectRef idx="0">
+                <a:schemeClr val="accent1"/>
+              </a:effectRef>
+              <a:fontRef idx="minor">
+                <a:schemeClr val="lt1"/>
+              </a:fontRef>
+            </p:style>
+            <p:txBody>
+              <a:bodyPr rtlCol="0" anchor="ctr"/>
+              <a:lstStyle/>
+              <a:p>
+                <a:pPr algn="ctr"/>
+                <a:endParaRPr lang="en-CA" sz="681"/>
+              </a:p>
+            </p:txBody>
+          </p:sp>
+          <p:cxnSp>
+            <p:nvCxnSpPr>
+              <p:cNvPr id="11" name="Straight Connector 10">
+                <a:extLst>
+                  <a:ext uri="{FF2B5EF4-FFF2-40B4-BE49-F238E27FC236}">
+                    <a16:creationId xmlns:a16="http://schemas.microsoft.com/office/drawing/2014/main" id="{C924AB2E-E8B1-4028-A75E-076BE721A65A}"/>
+                  </a:ext>
+                </a:extLst>
+              </p:cNvPr>
+              <p:cNvCxnSpPr>
+                <a:stCxn id="8" idx="1"/>
+                <a:endCxn id="8" idx="3"/>
+              </p:cNvCxnSpPr>
+              <p:nvPr/>
+            </p:nvCxnSpPr>
+            <p:spPr>
+              <a:xfrm>
+                <a:off x="2434206" y="4598251"/>
+                <a:ext cx="218112" cy="0"/>
+              </a:xfrm>
+              <a:prstGeom prst="line">
+                <a:avLst/>
+              </a:prstGeom>
+              <a:ln w="19050">
+                <a:solidFill>
+                  <a:schemeClr val="tx1"/>
+                </a:solidFill>
+              </a:ln>
+            </p:spPr>
+            <p:style>
+              <a:lnRef idx="1">
+                <a:schemeClr val="accent1"/>
+              </a:lnRef>
+              <a:fillRef idx="0">
+                <a:schemeClr val="accent1"/>
+              </a:fillRef>
+              <a:effectRef idx="0">
+                <a:schemeClr val="accent1"/>
+              </a:effectRef>
+              <a:fontRef idx="minor">
+                <a:schemeClr val="tx1"/>
+              </a:fontRef>
+            </p:style>
+          </p:cxnSp>
+        </p:grpSp>
+        <p:grpSp>
+          <p:nvGrpSpPr>
+            <p:cNvPr id="19" name="Group 18">
+              <a:extLst>
+                <a:ext uri="{FF2B5EF4-FFF2-40B4-BE49-F238E27FC236}">
+                  <a16:creationId xmlns:a16="http://schemas.microsoft.com/office/drawing/2014/main" id="{A89578D8-06F3-4BFB-AA3D-2D33FA688E31}"/>
+                </a:ext>
+              </a:extLst>
+            </p:cNvPr>
+            <p:cNvGrpSpPr/>
+            <p:nvPr/>
+          </p:nvGrpSpPr>
+          <p:grpSpPr>
+            <a:xfrm>
+              <a:off x="5609040" y="3271805"/>
+              <a:ext cx="973919" cy="2064900"/>
+              <a:chOff x="6853807" y="1609989"/>
+              <a:chExt cx="436225" cy="924883"/>
+            </a:xfrm>
+          </p:grpSpPr>
+          <p:sp>
+            <p:nvSpPr>
+              <p:cNvPr id="20" name="Oval 19">
+                <a:extLst>
+                  <a:ext uri="{FF2B5EF4-FFF2-40B4-BE49-F238E27FC236}">
+                    <a16:creationId xmlns:a16="http://schemas.microsoft.com/office/drawing/2014/main" id="{6CCD29D0-A159-4304-AC62-7E5C18B7D55F}"/>
+                  </a:ext>
+                </a:extLst>
+              </p:cNvPr>
+              <p:cNvSpPr/>
+              <p:nvPr/>
+            </p:nvSpPr>
+            <p:spPr>
+              <a:xfrm>
+                <a:off x="6904139" y="1609989"/>
+                <a:ext cx="343949" cy="343949"/>
+              </a:xfrm>
+              <a:prstGeom prst="ellipse">
+                <a:avLst/>
+              </a:prstGeom>
+              <a:solidFill>
+                <a:schemeClr val="tx1"/>
+              </a:solidFill>
+              <a:ln>
+                <a:solidFill>
+                  <a:schemeClr val="tx1"/>
+                </a:solidFill>
+              </a:ln>
+            </p:spPr>
+            <p:style>
+              <a:lnRef idx="2">
+                <a:schemeClr val="accent1">
+                  <a:shade val="50000"/>
+                </a:schemeClr>
+              </a:lnRef>
+              <a:fillRef idx="1">
+                <a:schemeClr val="accent1"/>
+              </a:fillRef>
+              <a:effectRef idx="0">
+                <a:schemeClr val="accent1"/>
+              </a:effectRef>
+              <a:fontRef idx="minor">
+                <a:schemeClr val="lt1"/>
+              </a:fontRef>
+            </p:style>
+            <p:txBody>
+              <a:bodyPr rtlCol="0" anchor="ctr"/>
+              <a:lstStyle/>
+              <a:p>
+                <a:pPr algn="ctr"/>
+                <a:endParaRPr lang="en-CA" sz="681"/>
+              </a:p>
+            </p:txBody>
+          </p:sp>
+          <p:cxnSp>
+            <p:nvCxnSpPr>
+              <p:cNvPr id="21" name="Straight Connector 20">
+                <a:extLst>
+                  <a:ext uri="{FF2B5EF4-FFF2-40B4-BE49-F238E27FC236}">
+                    <a16:creationId xmlns:a16="http://schemas.microsoft.com/office/drawing/2014/main" id="{FF1A6E15-7EAE-4476-9592-91E870DE2F33}"/>
+                  </a:ext>
+                </a:extLst>
+              </p:cNvPr>
+              <p:cNvCxnSpPr>
+                <a:stCxn id="20" idx="4"/>
+              </p:cNvCxnSpPr>
+              <p:nvPr/>
+            </p:nvCxnSpPr>
+            <p:spPr>
+              <a:xfrm flipH="1">
+                <a:off x="7071919" y="1953938"/>
+                <a:ext cx="4195" cy="361423"/>
+              </a:xfrm>
+              <a:prstGeom prst="line">
+                <a:avLst/>
+              </a:prstGeom>
+              <a:ln w="38100">
+                <a:solidFill>
+                  <a:schemeClr val="tx1"/>
+                </a:solidFill>
+              </a:ln>
+            </p:spPr>
+            <p:style>
+              <a:lnRef idx="1">
+                <a:schemeClr val="accent1"/>
+              </a:lnRef>
+              <a:fillRef idx="0">
+                <a:schemeClr val="accent1"/>
+              </a:fillRef>
+              <a:effectRef idx="0">
+                <a:schemeClr val="accent1"/>
+              </a:effectRef>
+              <a:fontRef idx="minor">
+                <a:schemeClr val="tx1"/>
+              </a:fontRef>
+            </p:style>
+          </p:cxnSp>
+          <p:cxnSp>
+            <p:nvCxnSpPr>
+              <p:cNvPr id="22" name="Straight Connector 21">
+                <a:extLst>
+                  <a:ext uri="{FF2B5EF4-FFF2-40B4-BE49-F238E27FC236}">
+                    <a16:creationId xmlns:a16="http://schemas.microsoft.com/office/drawing/2014/main" id="{A1165704-A1CC-42A0-AE80-1A8BCFB716D7}"/>
+                  </a:ext>
+                </a:extLst>
+              </p:cNvPr>
+              <p:cNvCxnSpPr/>
+              <p:nvPr/>
+            </p:nvCxnSpPr>
+            <p:spPr>
+              <a:xfrm flipV="1">
+                <a:off x="7071919" y="1996580"/>
+                <a:ext cx="218113" cy="218113"/>
+              </a:xfrm>
+              <a:prstGeom prst="line">
+                <a:avLst/>
+              </a:prstGeom>
+              <a:ln w="38100">
+                <a:solidFill>
+                  <a:schemeClr val="tx1"/>
+                </a:solidFill>
+              </a:ln>
+            </p:spPr>
+            <p:style>
+              <a:lnRef idx="1">
+                <a:schemeClr val="accent1"/>
+              </a:lnRef>
+              <a:fillRef idx="0">
+                <a:schemeClr val="accent1"/>
+              </a:fillRef>
+              <a:effectRef idx="0">
+                <a:schemeClr val="accent1"/>
+              </a:effectRef>
+              <a:fontRef idx="minor">
+                <a:schemeClr val="tx1"/>
+              </a:fontRef>
+            </p:style>
+          </p:cxnSp>
+          <p:cxnSp>
+            <p:nvCxnSpPr>
+              <p:cNvPr id="23" name="Straight Connector 22">
+                <a:extLst>
+                  <a:ext uri="{FF2B5EF4-FFF2-40B4-BE49-F238E27FC236}">
+                    <a16:creationId xmlns:a16="http://schemas.microsoft.com/office/drawing/2014/main" id="{B82B6A95-E24A-40B0-92D9-02E3E5B79230}"/>
+                  </a:ext>
+                </a:extLst>
+              </p:cNvPr>
+              <p:cNvCxnSpPr>
+                <a:cxnSpLocks/>
+              </p:cNvCxnSpPr>
+              <p:nvPr/>
+            </p:nvCxnSpPr>
+            <p:spPr>
+              <a:xfrm flipH="1" flipV="1">
+                <a:off x="6853807" y="2005670"/>
+                <a:ext cx="218112" cy="209023"/>
+              </a:xfrm>
+              <a:prstGeom prst="line">
+                <a:avLst/>
+              </a:prstGeom>
+              <a:ln w="38100">
+                <a:solidFill>
+                  <a:schemeClr val="tx1"/>
+                </a:solidFill>
+              </a:ln>
+            </p:spPr>
+            <p:style>
+              <a:lnRef idx="1">
+                <a:schemeClr val="accent1"/>
+              </a:lnRef>
+              <a:fillRef idx="0">
+                <a:schemeClr val="accent1"/>
+              </a:fillRef>
+              <a:effectRef idx="0">
+                <a:schemeClr val="accent1"/>
+              </a:effectRef>
+              <a:fontRef idx="minor">
+                <a:schemeClr val="tx1"/>
+              </a:fontRef>
+            </p:style>
+          </p:cxnSp>
+          <p:grpSp>
+            <p:nvGrpSpPr>
+              <p:cNvPr id="24" name="Group 23">
+                <a:extLst>
+                  <a:ext uri="{FF2B5EF4-FFF2-40B4-BE49-F238E27FC236}">
+                    <a16:creationId xmlns:a16="http://schemas.microsoft.com/office/drawing/2014/main" id="{22996A92-FB9D-4953-AA77-6B1830FFA2AB}"/>
+                  </a:ext>
+                </a:extLst>
+              </p:cNvPr>
+              <p:cNvGrpSpPr/>
+              <p:nvPr/>
+            </p:nvGrpSpPr>
+            <p:grpSpPr>
+              <a:xfrm rot="10800000">
+                <a:off x="6853807" y="2316759"/>
+                <a:ext cx="436225" cy="218113"/>
+                <a:chOff x="6962863" y="2659310"/>
+                <a:chExt cx="436225" cy="218113"/>
+              </a:xfrm>
+            </p:grpSpPr>
+            <p:cxnSp>
+              <p:nvCxnSpPr>
+                <p:cNvPr id="25" name="Straight Connector 24">
+                  <a:extLst>
+                    <a:ext uri="{FF2B5EF4-FFF2-40B4-BE49-F238E27FC236}">
+                      <a16:creationId xmlns:a16="http://schemas.microsoft.com/office/drawing/2014/main" id="{FD0AF9FD-8165-4C08-97AD-2C66E0EC72D4}"/>
+                    </a:ext>
+                  </a:extLst>
+                </p:cNvPr>
+                <p:cNvCxnSpPr/>
+                <p:nvPr/>
+              </p:nvCxnSpPr>
+              <p:spPr>
+                <a:xfrm flipV="1">
+                  <a:off x="7180975" y="2659310"/>
+                  <a:ext cx="218113" cy="218113"/>
+                </a:xfrm>
+                <a:prstGeom prst="line">
+                  <a:avLst/>
+                </a:prstGeom>
+                <a:ln w="38100">
+                  <a:solidFill>
+                    <a:schemeClr val="tx1"/>
+                  </a:solidFill>
+                </a:ln>
+              </p:spPr>
+              <p:style>
+                <a:lnRef idx="1">
+                  <a:schemeClr val="accent1"/>
+                </a:lnRef>
+                <a:fillRef idx="0">
+                  <a:schemeClr val="accent1"/>
+                </a:fillRef>
+                <a:effectRef idx="0">
+                  <a:schemeClr val="accent1"/>
+                </a:effectRef>
+                <a:fontRef idx="minor">
+                  <a:schemeClr val="tx1"/>
+                </a:fontRef>
+              </p:style>
+            </p:cxnSp>
+            <p:cxnSp>
+              <p:nvCxnSpPr>
+                <p:cNvPr id="26" name="Straight Connector 25">
+                  <a:extLst>
+                    <a:ext uri="{FF2B5EF4-FFF2-40B4-BE49-F238E27FC236}">
+                      <a16:creationId xmlns:a16="http://schemas.microsoft.com/office/drawing/2014/main" id="{D21DB0DB-8446-4680-95F6-001AF71997AE}"/>
+                    </a:ext>
+                  </a:extLst>
+                </p:cNvPr>
+                <p:cNvCxnSpPr>
+                  <a:cxnSpLocks/>
+                </p:cNvCxnSpPr>
+                <p:nvPr/>
+              </p:nvCxnSpPr>
+              <p:spPr>
+                <a:xfrm flipH="1" flipV="1">
+                  <a:off x="6962863" y="2668400"/>
+                  <a:ext cx="218112" cy="209023"/>
+                </a:xfrm>
+                <a:prstGeom prst="line">
+                  <a:avLst/>
+                </a:prstGeom>
+                <a:ln w="38100">
+                  <a:solidFill>
+                    <a:schemeClr val="tx1"/>
+                  </a:solidFill>
+                </a:ln>
+              </p:spPr>
+              <p:style>
+                <a:lnRef idx="1">
+                  <a:schemeClr val="accent1"/>
+                </a:lnRef>
+                <a:fillRef idx="0">
+                  <a:schemeClr val="accent1"/>
+                </a:fillRef>
+                <a:effectRef idx="0">
+                  <a:schemeClr val="accent1"/>
+                </a:effectRef>
+                <a:fontRef idx="minor">
+                  <a:schemeClr val="tx1"/>
+                </a:fontRef>
+              </p:style>
+            </p:cxnSp>
+          </p:grpSp>
+        </p:grpSp>
+        <p:grpSp>
+          <p:nvGrpSpPr>
+            <p:cNvPr id="27" name="Group 26">
+              <a:extLst>
+                <a:ext uri="{FF2B5EF4-FFF2-40B4-BE49-F238E27FC236}">
+                  <a16:creationId xmlns:a16="http://schemas.microsoft.com/office/drawing/2014/main" id="{A2F4AD37-2515-4BFE-B101-368EEA287198}"/>
+                </a:ext>
+              </a:extLst>
+            </p:cNvPr>
+            <p:cNvGrpSpPr/>
+            <p:nvPr/>
+          </p:nvGrpSpPr>
+          <p:grpSpPr>
+            <a:xfrm>
+              <a:off x="7450331" y="3879038"/>
+              <a:ext cx="664876" cy="1423520"/>
+              <a:chOff x="2325150" y="3951215"/>
+              <a:chExt cx="436225" cy="933973"/>
+            </a:xfrm>
+          </p:grpSpPr>
+          <p:grpSp>
+            <p:nvGrpSpPr>
+              <p:cNvPr id="28" name="Group 27">
+                <a:extLst>
+                  <a:ext uri="{FF2B5EF4-FFF2-40B4-BE49-F238E27FC236}">
+                    <a16:creationId xmlns:a16="http://schemas.microsoft.com/office/drawing/2014/main" id="{0667FDD4-3E55-42F8-B470-A4CEC2A67224}"/>
+                  </a:ext>
+                </a:extLst>
+              </p:cNvPr>
+              <p:cNvGrpSpPr/>
+              <p:nvPr/>
+            </p:nvGrpSpPr>
+            <p:grpSpPr>
+              <a:xfrm>
+                <a:off x="2325150" y="3960305"/>
+                <a:ext cx="436225" cy="924883"/>
+                <a:chOff x="6853807" y="1609989"/>
+                <a:chExt cx="436225" cy="924883"/>
+              </a:xfrm>
+            </p:grpSpPr>
+            <p:sp>
+              <p:nvSpPr>
+                <p:cNvPr id="34" name="Oval 33">
+                  <a:extLst>
+                    <a:ext uri="{FF2B5EF4-FFF2-40B4-BE49-F238E27FC236}">
+                      <a16:creationId xmlns:a16="http://schemas.microsoft.com/office/drawing/2014/main" id="{311C3D06-24DD-4E3E-9D44-BD1F70940795}"/>
+                    </a:ext>
+                  </a:extLst>
+                </p:cNvPr>
+                <p:cNvSpPr/>
+                <p:nvPr/>
+              </p:nvSpPr>
+              <p:spPr>
+                <a:xfrm>
+                  <a:off x="6904139" y="1609989"/>
+                  <a:ext cx="343949" cy="343949"/>
+                </a:xfrm>
+                <a:prstGeom prst="ellipse">
+                  <a:avLst/>
+                </a:prstGeom>
+                <a:solidFill>
+                  <a:schemeClr val="tx1"/>
+                </a:solidFill>
+                <a:ln>
+                  <a:solidFill>
+                    <a:schemeClr val="tx1"/>
+                  </a:solidFill>
+                </a:ln>
+              </p:spPr>
+              <p:style>
+                <a:lnRef idx="2">
+                  <a:schemeClr val="accent1">
+                    <a:shade val="50000"/>
+                  </a:schemeClr>
+                </a:lnRef>
+                <a:fillRef idx="1">
+                  <a:schemeClr val="accent1"/>
+                </a:fillRef>
+                <a:effectRef idx="0">
+                  <a:schemeClr val="accent1"/>
+                </a:effectRef>
+                <a:fontRef idx="minor">
+                  <a:schemeClr val="lt1"/>
+                </a:fontRef>
+              </p:style>
+              <p:txBody>
+                <a:bodyPr rtlCol="0" anchor="ctr"/>
+                <a:lstStyle/>
+                <a:p>
+                  <a:pPr algn="ctr"/>
+                  <a:endParaRPr lang="en-CA" sz="681"/>
+                </a:p>
+              </p:txBody>
+            </p:sp>
+            <p:cxnSp>
+              <p:nvCxnSpPr>
+                <p:cNvPr id="35" name="Straight Connector 34">
+                  <a:extLst>
+                    <a:ext uri="{FF2B5EF4-FFF2-40B4-BE49-F238E27FC236}">
+                      <a16:creationId xmlns:a16="http://schemas.microsoft.com/office/drawing/2014/main" id="{7252CA95-82DB-4BF0-99EA-1B54E00C0665}"/>
+                    </a:ext>
+                  </a:extLst>
+                </p:cNvPr>
+                <p:cNvCxnSpPr>
+                  <a:stCxn id="34" idx="4"/>
+                </p:cNvCxnSpPr>
+                <p:nvPr/>
+              </p:nvCxnSpPr>
+              <p:spPr>
+                <a:xfrm flipH="1">
+                  <a:off x="7071919" y="1953938"/>
+                  <a:ext cx="4195" cy="361423"/>
+                </a:xfrm>
+                <a:prstGeom prst="line">
+                  <a:avLst/>
+                </a:prstGeom>
+                <a:ln w="38100">
+                  <a:solidFill>
+                    <a:schemeClr val="tx1"/>
+                  </a:solidFill>
+                </a:ln>
+              </p:spPr>
+              <p:style>
+                <a:lnRef idx="1">
+                  <a:schemeClr val="accent1"/>
+                </a:lnRef>
+                <a:fillRef idx="0">
+                  <a:schemeClr val="accent1"/>
+                </a:fillRef>
+                <a:effectRef idx="0">
+                  <a:schemeClr val="accent1"/>
+                </a:effectRef>
+                <a:fontRef idx="minor">
+                  <a:schemeClr val="tx1"/>
+                </a:fontRef>
+              </p:style>
+            </p:cxnSp>
+            <p:cxnSp>
+              <p:nvCxnSpPr>
+                <p:cNvPr id="36" name="Straight Connector 35">
+                  <a:extLst>
+                    <a:ext uri="{FF2B5EF4-FFF2-40B4-BE49-F238E27FC236}">
+                      <a16:creationId xmlns:a16="http://schemas.microsoft.com/office/drawing/2014/main" id="{3C20C753-051A-4080-979A-193AFE5F6064}"/>
+                    </a:ext>
+                  </a:extLst>
+                </p:cNvPr>
+                <p:cNvCxnSpPr/>
+                <p:nvPr/>
+              </p:nvCxnSpPr>
+              <p:spPr>
+                <a:xfrm flipV="1">
+                  <a:off x="7071919" y="1996580"/>
+                  <a:ext cx="218113" cy="218113"/>
+                </a:xfrm>
+                <a:prstGeom prst="line">
+                  <a:avLst/>
+                </a:prstGeom>
+                <a:ln w="38100">
+                  <a:solidFill>
+                    <a:schemeClr val="tx1"/>
+                  </a:solidFill>
+                </a:ln>
+              </p:spPr>
+              <p:style>
+                <a:lnRef idx="1">
+                  <a:schemeClr val="accent1"/>
+                </a:lnRef>
+                <a:fillRef idx="0">
+                  <a:schemeClr val="accent1"/>
+                </a:fillRef>
+                <a:effectRef idx="0">
+                  <a:schemeClr val="accent1"/>
+                </a:effectRef>
+                <a:fontRef idx="minor">
+                  <a:schemeClr val="tx1"/>
+                </a:fontRef>
+              </p:style>
+            </p:cxnSp>
+            <p:cxnSp>
+              <p:nvCxnSpPr>
+                <p:cNvPr id="37" name="Straight Connector 36">
+                  <a:extLst>
+                    <a:ext uri="{FF2B5EF4-FFF2-40B4-BE49-F238E27FC236}">
+                      <a16:creationId xmlns:a16="http://schemas.microsoft.com/office/drawing/2014/main" id="{9C426F08-7E53-4AFD-84AD-317E46F34582}"/>
+                    </a:ext>
+                  </a:extLst>
+                </p:cNvPr>
+                <p:cNvCxnSpPr>
+                  <a:cxnSpLocks/>
+                </p:cNvCxnSpPr>
+                <p:nvPr/>
+              </p:nvCxnSpPr>
+              <p:spPr>
+                <a:xfrm flipH="1" flipV="1">
+                  <a:off x="6853807" y="2005670"/>
+                  <a:ext cx="218112" cy="209023"/>
+                </a:xfrm>
+                <a:prstGeom prst="line">
+                  <a:avLst/>
+                </a:prstGeom>
+                <a:ln w="38100">
+                  <a:solidFill>
+                    <a:schemeClr val="tx1"/>
+                  </a:solidFill>
+                </a:ln>
+              </p:spPr>
+              <p:style>
+                <a:lnRef idx="1">
+                  <a:schemeClr val="accent1"/>
+                </a:lnRef>
+                <a:fillRef idx="0">
+                  <a:schemeClr val="accent1"/>
+                </a:fillRef>
+                <a:effectRef idx="0">
+                  <a:schemeClr val="accent1"/>
+                </a:effectRef>
+                <a:fontRef idx="minor">
+                  <a:schemeClr val="tx1"/>
+                </a:fontRef>
+              </p:style>
+            </p:cxnSp>
+            <p:grpSp>
+              <p:nvGrpSpPr>
+                <p:cNvPr id="38" name="Group 37">
+                  <a:extLst>
+                    <a:ext uri="{FF2B5EF4-FFF2-40B4-BE49-F238E27FC236}">
+                      <a16:creationId xmlns:a16="http://schemas.microsoft.com/office/drawing/2014/main" id="{D4EC5127-9C79-466C-83F0-6C422A8E06CD}"/>
+                    </a:ext>
+                  </a:extLst>
+                </p:cNvPr>
+                <p:cNvGrpSpPr/>
+                <p:nvPr/>
+              </p:nvGrpSpPr>
+              <p:grpSpPr>
+                <a:xfrm rot="10800000">
+                  <a:off x="6853807" y="2316759"/>
+                  <a:ext cx="436225" cy="218113"/>
+                  <a:chOff x="6962863" y="2659310"/>
+                  <a:chExt cx="436225" cy="218113"/>
+                </a:xfrm>
+              </p:grpSpPr>
+              <p:cxnSp>
+                <p:nvCxnSpPr>
+                  <p:cNvPr id="39" name="Straight Connector 38">
+                    <a:extLst>
+                      <a:ext uri="{FF2B5EF4-FFF2-40B4-BE49-F238E27FC236}">
+                        <a16:creationId xmlns:a16="http://schemas.microsoft.com/office/drawing/2014/main" id="{CA9FB347-1DC1-4CBB-A0F9-D720C67BF2C5}"/>
+                      </a:ext>
+                    </a:extLst>
+                  </p:cNvPr>
+                  <p:cNvCxnSpPr/>
+                  <p:nvPr/>
+                </p:nvCxnSpPr>
+                <p:spPr>
+                  <a:xfrm flipV="1">
+                    <a:off x="7180975" y="2659310"/>
+                    <a:ext cx="218113" cy="218113"/>
+                  </a:xfrm>
+                  <a:prstGeom prst="line">
+                    <a:avLst/>
+                  </a:prstGeom>
+                  <a:ln w="38100">
+                    <a:solidFill>
+                      <a:schemeClr val="tx1"/>
+                    </a:solidFill>
+                  </a:ln>
+                </p:spPr>
+                <p:style>
+                  <a:lnRef idx="1">
+                    <a:schemeClr val="accent1"/>
+                  </a:lnRef>
+                  <a:fillRef idx="0">
+                    <a:schemeClr val="accent1"/>
+                  </a:fillRef>
+                  <a:effectRef idx="0">
+                    <a:schemeClr val="accent1"/>
+                  </a:effectRef>
+                  <a:fontRef idx="minor">
+                    <a:schemeClr val="tx1"/>
+                  </a:fontRef>
+                </p:style>
+              </p:cxnSp>
+              <p:cxnSp>
+                <p:nvCxnSpPr>
+                  <p:cNvPr id="40" name="Straight Connector 39">
+                    <a:extLst>
+                      <a:ext uri="{FF2B5EF4-FFF2-40B4-BE49-F238E27FC236}">
+                        <a16:creationId xmlns:a16="http://schemas.microsoft.com/office/drawing/2014/main" id="{B96F1981-2316-482F-9706-99F19C91D9DB}"/>
+                      </a:ext>
+                    </a:extLst>
+                  </p:cNvPr>
+                  <p:cNvCxnSpPr>
+                    <a:cxnSpLocks/>
+                  </p:cNvCxnSpPr>
+                  <p:nvPr/>
+                </p:nvCxnSpPr>
+                <p:spPr>
+                  <a:xfrm flipH="1" flipV="1">
+                    <a:off x="6962863" y="2668400"/>
+                    <a:ext cx="218112" cy="209023"/>
+                  </a:xfrm>
+                  <a:prstGeom prst="line">
+                    <a:avLst/>
+                  </a:prstGeom>
+                  <a:ln w="38100">
+                    <a:solidFill>
+                      <a:schemeClr val="tx1"/>
+                    </a:solidFill>
+                  </a:ln>
+                </p:spPr>
+                <p:style>
+                  <a:lnRef idx="1">
+                    <a:schemeClr val="accent1"/>
+                  </a:lnRef>
+                  <a:fillRef idx="0">
+                    <a:schemeClr val="accent1"/>
+                  </a:fillRef>
+                  <a:effectRef idx="0">
+                    <a:schemeClr val="accent1"/>
+                  </a:effectRef>
+                  <a:fontRef idx="minor">
+                    <a:schemeClr val="tx1"/>
+                  </a:fontRef>
+                </p:style>
+              </p:cxnSp>
+            </p:grpSp>
+          </p:grpSp>
+          <p:sp>
+            <p:nvSpPr>
+              <p:cNvPr id="29" name="Arc 28">
+                <a:extLst>
+                  <a:ext uri="{FF2B5EF4-FFF2-40B4-BE49-F238E27FC236}">
+                    <a16:creationId xmlns:a16="http://schemas.microsoft.com/office/drawing/2014/main" id="{9F233A01-B645-44CA-BE31-5BCB196FF5A9}"/>
+                  </a:ext>
+                </a:extLst>
+              </p:cNvPr>
+              <p:cNvSpPr/>
+              <p:nvPr/>
+            </p:nvSpPr>
+            <p:spPr>
+              <a:xfrm flipV="1">
+                <a:off x="2375482" y="3951215"/>
+                <a:ext cx="343949" cy="156159"/>
+              </a:xfrm>
+              <a:prstGeom prst="arc">
+                <a:avLst>
+                  <a:gd name="adj1" fmla="val 11243172"/>
+                  <a:gd name="adj2" fmla="val 21239460"/>
+                </a:avLst>
+              </a:prstGeom>
+              <a:noFill/>
+              <a:ln w="38100">
+                <a:solidFill>
+                  <a:srgbClr val="7030A0"/>
+                </a:solidFill>
+              </a:ln>
+            </p:spPr>
+            <p:style>
+              <a:lnRef idx="1">
+                <a:schemeClr val="accent1"/>
+              </a:lnRef>
+              <a:fillRef idx="0">
+                <a:schemeClr val="accent1"/>
+              </a:fillRef>
+              <a:effectRef idx="0">
+                <a:schemeClr val="accent1"/>
+              </a:effectRef>
+              <a:fontRef idx="minor">
+                <a:schemeClr val="tx1"/>
+              </a:fontRef>
+            </p:style>
+            <p:txBody>
+              <a:bodyPr rtlCol="0" anchor="ctr"/>
+              <a:lstStyle/>
+              <a:p>
+                <a:pPr algn="ctr"/>
+                <a:endParaRPr lang="en-CA" sz="681"/>
+              </a:p>
+            </p:txBody>
+          </p:sp>
+          <p:sp>
+            <p:nvSpPr>
+              <p:cNvPr id="30" name="Rectangle 29">
+                <a:extLst>
+                  <a:ext uri="{FF2B5EF4-FFF2-40B4-BE49-F238E27FC236}">
+                    <a16:creationId xmlns:a16="http://schemas.microsoft.com/office/drawing/2014/main" id="{5644387C-E97F-48A5-86F8-B263E87B5A6E}"/>
+                  </a:ext>
+                </a:extLst>
+              </p:cNvPr>
+              <p:cNvSpPr/>
+              <p:nvPr/>
+            </p:nvSpPr>
+            <p:spPr>
+              <a:xfrm>
+                <a:off x="2434206" y="4406320"/>
+                <a:ext cx="218112" cy="383862"/>
+              </a:xfrm>
+              <a:prstGeom prst="rect">
+                <a:avLst/>
+              </a:prstGeom>
+              <a:solidFill>
+                <a:srgbClr val="7030A0"/>
+              </a:solidFill>
+              <a:ln>
+                <a:noFill/>
+              </a:ln>
+            </p:spPr>
+            <p:style>
+              <a:lnRef idx="2">
+                <a:schemeClr val="accent1">
+                  <a:shade val="50000"/>
+                </a:schemeClr>
+              </a:lnRef>
+              <a:fillRef idx="1">
+                <a:schemeClr val="accent1"/>
+              </a:fillRef>
+              <a:effectRef idx="0">
+                <a:schemeClr val="accent1"/>
+              </a:effectRef>
+              <a:fontRef idx="minor">
+                <a:schemeClr val="lt1"/>
+              </a:fontRef>
+            </p:style>
+            <p:txBody>
+              <a:bodyPr rtlCol="0" anchor="ctr"/>
+              <a:lstStyle/>
+              <a:p>
+                <a:pPr algn="ctr"/>
+                <a:endParaRPr lang="en-CA" sz="681"/>
+              </a:p>
+            </p:txBody>
+          </p:sp>
+          <p:sp>
+            <p:nvSpPr>
+              <p:cNvPr id="31" name="Rectangle 30">
+                <a:extLst>
+                  <a:ext uri="{FF2B5EF4-FFF2-40B4-BE49-F238E27FC236}">
+                    <a16:creationId xmlns:a16="http://schemas.microsoft.com/office/drawing/2014/main" id="{9FA0BAE7-5B8F-4211-BF4B-B4423C8C4319}"/>
+                  </a:ext>
+                </a:extLst>
+              </p:cNvPr>
+              <p:cNvSpPr/>
+              <p:nvPr/>
+            </p:nvSpPr>
+            <p:spPr>
+              <a:xfrm>
+                <a:off x="2651168" y="4387903"/>
+                <a:ext cx="55679" cy="88847"/>
+              </a:xfrm>
+              <a:prstGeom prst="rect">
+                <a:avLst/>
+              </a:prstGeom>
+              <a:solidFill>
+                <a:srgbClr val="7030A0"/>
+              </a:solidFill>
+              <a:ln>
+                <a:solidFill>
+                  <a:srgbClr val="7030A0"/>
+                </a:solidFill>
+              </a:ln>
+            </p:spPr>
+            <p:style>
+              <a:lnRef idx="2">
+                <a:schemeClr val="accent1">
+                  <a:shade val="50000"/>
+                </a:schemeClr>
+              </a:lnRef>
+              <a:fillRef idx="1">
+                <a:schemeClr val="accent1"/>
+              </a:fillRef>
+              <a:effectRef idx="0">
+                <a:schemeClr val="accent1"/>
+              </a:effectRef>
+              <a:fontRef idx="minor">
+                <a:schemeClr val="lt1"/>
+              </a:fontRef>
+            </p:style>
+            <p:txBody>
+              <a:bodyPr rtlCol="0" anchor="ctr"/>
+              <a:lstStyle/>
+              <a:p>
+                <a:pPr algn="ctr"/>
+                <a:endParaRPr lang="en-CA" sz="681"/>
+              </a:p>
+            </p:txBody>
+          </p:sp>
+          <p:sp>
+            <p:nvSpPr>
+              <p:cNvPr id="32" name="Rectangle 31">
+                <a:extLst>
+                  <a:ext uri="{FF2B5EF4-FFF2-40B4-BE49-F238E27FC236}">
+                    <a16:creationId xmlns:a16="http://schemas.microsoft.com/office/drawing/2014/main" id="{0B2B008E-E2EB-4286-BC25-ADC1B1C0AC81}"/>
+                  </a:ext>
+                </a:extLst>
+              </p:cNvPr>
+              <p:cNvSpPr/>
+              <p:nvPr/>
+            </p:nvSpPr>
+            <p:spPr>
+              <a:xfrm>
+                <a:off x="2379677" y="4387903"/>
+                <a:ext cx="55679" cy="88847"/>
+              </a:xfrm>
+              <a:prstGeom prst="rect">
+                <a:avLst/>
+              </a:prstGeom>
+              <a:solidFill>
+                <a:srgbClr val="7030A0"/>
+              </a:solidFill>
+              <a:ln>
+                <a:solidFill>
+                  <a:srgbClr val="7030A0"/>
+                </a:solidFill>
+              </a:ln>
+            </p:spPr>
+            <p:style>
+              <a:lnRef idx="2">
+                <a:schemeClr val="accent1">
+                  <a:shade val="50000"/>
+                </a:schemeClr>
+              </a:lnRef>
+              <a:fillRef idx="1">
+                <a:schemeClr val="accent1"/>
+              </a:fillRef>
+              <a:effectRef idx="0">
+                <a:schemeClr val="accent1"/>
+              </a:effectRef>
+              <a:fontRef idx="minor">
+                <a:schemeClr val="lt1"/>
+              </a:fontRef>
+            </p:style>
+            <p:txBody>
+              <a:bodyPr rtlCol="0" anchor="ctr"/>
+              <a:lstStyle/>
+              <a:p>
+                <a:pPr algn="ctr"/>
+                <a:endParaRPr lang="en-CA" sz="681"/>
+              </a:p>
+            </p:txBody>
+          </p:sp>
+          <p:cxnSp>
+            <p:nvCxnSpPr>
+              <p:cNvPr id="33" name="Straight Connector 32">
+                <a:extLst>
+                  <a:ext uri="{FF2B5EF4-FFF2-40B4-BE49-F238E27FC236}">
+                    <a16:creationId xmlns:a16="http://schemas.microsoft.com/office/drawing/2014/main" id="{A4459FAF-5C92-4E06-8C1A-649C5B60983B}"/>
+                  </a:ext>
+                </a:extLst>
+              </p:cNvPr>
+              <p:cNvCxnSpPr>
+                <a:stCxn id="30" idx="1"/>
+                <a:endCxn id="30" idx="3"/>
+              </p:cNvCxnSpPr>
+              <p:nvPr/>
+            </p:nvCxnSpPr>
+            <p:spPr>
+              <a:xfrm>
+                <a:off x="2434206" y="4598251"/>
+                <a:ext cx="218112" cy="0"/>
+              </a:xfrm>
+              <a:prstGeom prst="line">
+                <a:avLst/>
+              </a:prstGeom>
+              <a:ln w="19050">
+                <a:solidFill>
+                  <a:schemeClr val="tx1"/>
+                </a:solidFill>
+              </a:ln>
+            </p:spPr>
+            <p:style>
+              <a:lnRef idx="1">
+                <a:schemeClr val="accent1"/>
+              </a:lnRef>
+              <a:fillRef idx="0">
+                <a:schemeClr val="accent1"/>
+              </a:fillRef>
+              <a:effectRef idx="0">
+                <a:schemeClr val="accent1"/>
+              </a:effectRef>
+              <a:fontRef idx="minor">
+                <a:schemeClr val="tx1"/>
+              </a:fontRef>
+            </p:style>
+          </p:cxnSp>
+        </p:grpSp>
+        <p:pic>
+          <p:nvPicPr>
+            <p:cNvPr id="44" name="Picture 43">
+              <a:extLst>
+                <a:ext uri="{FF2B5EF4-FFF2-40B4-BE49-F238E27FC236}">
+                  <a16:creationId xmlns:a16="http://schemas.microsoft.com/office/drawing/2014/main" id="{5B5BA2B9-0977-4888-A98A-B9A58CA8B423}"/>
+                </a:ext>
+              </a:extLst>
+            </p:cNvPr>
+            <p:cNvPicPr>
+              <a:picLocks noChangeAspect="1"/>
+            </p:cNvPicPr>
+            <p:nvPr/>
+          </p:nvPicPr>
+          <p:blipFill>
+            <a:blip r:embed="rId2">
+              <a:extLst>
+                <a:ext uri="{28A0092B-C50C-407E-A947-70E740481C1C}">
+                  <a14:useLocalDpi xmlns:a14="http://schemas.microsoft.com/office/drawing/2010/main" val="0"/>
+                </a:ext>
+              </a:extLst>
+            </a:blip>
+            <a:stretch>
+              <a:fillRect/>
+            </a:stretch>
+          </p:blipFill>
+          <p:spPr>
+            <a:xfrm rot="16200000">
+              <a:off x="7632489" y="2774711"/>
+              <a:ext cx="3971915" cy="1152075"/>
+            </a:xfrm>
+            <a:prstGeom prst="rect">
+              <a:avLst/>
+            </a:prstGeom>
+          </p:spPr>
+        </p:pic>
+        <p:sp>
+          <p:nvSpPr>
+            <p:cNvPr id="45" name="TextBox 44">
+              <a:extLst>
+                <a:ext uri="{FF2B5EF4-FFF2-40B4-BE49-F238E27FC236}">
+                  <a16:creationId xmlns:a16="http://schemas.microsoft.com/office/drawing/2014/main" id="{E21AD179-C9E6-470D-BE84-565431B8D3E8}"/>
+                </a:ext>
+              </a:extLst>
+            </p:cNvPr>
+            <p:cNvSpPr txBox="1"/>
+            <p:nvPr/>
+          </p:nvSpPr>
+          <p:spPr>
+            <a:xfrm>
+              <a:off x="1814394" y="1210020"/>
+              <a:ext cx="8581937" cy="1938992"/>
+            </a:xfrm>
+            <a:prstGeom prst="rect">
+              <a:avLst/>
+            </a:prstGeom>
+            <a:noFill/>
+          </p:spPr>
+          <p:txBody>
+            <a:bodyPr wrap="square" rtlCol="0">
+              <a:spAutoFit/>
+            </a:bodyPr>
+            <a:lstStyle/>
+            <a:p>
+              <a:pPr algn="ctr"/>
+              <a:r>
+                <a:rPr lang="en-CA" sz="6000" b="1" dirty="0"/>
+                <a:t>STICKMAN</a:t>
+              </a:r>
+            </a:p>
+            <a:p>
+              <a:pPr algn="ctr"/>
+              <a:r>
+                <a:rPr lang="en-CA" sz="6000" b="1" dirty="0"/>
+                <a:t>DODGEBALL</a:t>
+              </a:r>
+            </a:p>
+          </p:txBody>
+        </p:sp>
+        <p:pic>
+          <p:nvPicPr>
+            <p:cNvPr id="46" name="Picture 45">
+              <a:extLst>
+                <a:ext uri="{FF2B5EF4-FFF2-40B4-BE49-F238E27FC236}">
+                  <a16:creationId xmlns:a16="http://schemas.microsoft.com/office/drawing/2014/main" id="{0BA8E0F2-5675-4073-9F27-123EF70F96D1}"/>
+                </a:ext>
+              </a:extLst>
+            </p:cNvPr>
+            <p:cNvPicPr>
+              <a:picLocks noChangeAspect="1"/>
+            </p:cNvPicPr>
+            <p:nvPr/>
+          </p:nvPicPr>
+          <p:blipFill>
+            <a:blip r:embed="rId2">
+              <a:extLst>
+                <a:ext uri="{28A0092B-C50C-407E-A947-70E740481C1C}">
+                  <a14:useLocalDpi xmlns:a14="http://schemas.microsoft.com/office/drawing/2010/main" val="0"/>
+                </a:ext>
+              </a:extLst>
+            </a:blip>
+            <a:stretch>
+              <a:fillRect/>
+            </a:stretch>
+          </p:blipFill>
+          <p:spPr>
+            <a:xfrm rot="16200000">
+              <a:off x="577021" y="2774711"/>
+              <a:ext cx="3971915" cy="1152075"/>
+            </a:xfrm>
+            <a:prstGeom prst="rect">
+              <a:avLst/>
+            </a:prstGeom>
+          </p:spPr>
+        </p:pic>
+      </p:grpSp>
+    </p:spTree>
+    <p:extLst>
+      <p:ext uri="{BB962C8B-B14F-4D97-AF65-F5344CB8AC3E}">
+        <p14:creationId xmlns:p14="http://schemas.microsoft.com/office/powerpoint/2010/main" val="3023490105"/>
+      </p:ext>
+    </p:extLst>
+  </p:cSld>
+  <p:clrMapOvr>
+    <a:masterClrMapping/>
+  </p:clrMapOvr>
+</p:sld>
+</file>
+
+<file path=ppt/slides/slide3.xml><?xml version="1.0" encoding="utf-8"?>
+<p:sld xmlns:a="http://schemas.openxmlformats.org/drawingml/2006/main" xmlns:r="http://schemas.openxmlformats.org/officeDocument/2006/relationships" xmlns:p="http://schemas.openxmlformats.org/presentationml/2006/main">
+  <p:cSld>
+    <p:spTree>
+      <p:nvGrpSpPr>
+        <p:cNvPr id="1" name=""/>
+        <p:cNvGrpSpPr/>
+        <p:nvPr/>
+      </p:nvGrpSpPr>
+      <p:grpSpPr>
+        <a:xfrm>
+          <a:off x="0" y="0"/>
+          <a:ext cx="0" cy="0"/>
+          <a:chOff x="0" y="0"/>
+          <a:chExt cx="0" cy="0"/>
+        </a:xfrm>
+      </p:grpSpPr>
+      <p:grpSp>
+        <p:nvGrpSpPr>
           <p:cNvPr id="20" name="Group 19">
             <a:extLst>
               <a:ext uri="{FF2B5EF4-FFF2-40B4-BE49-F238E27FC236}">

</xml_diff>